<commit_message>
fixing the risk prediction bugs
</commit_message>
<xml_diff>
--- a/PPG/reports/PPG progress report 2017_11_06.pptx
+++ b/PPG/reports/PPG progress report 2017_11_06.pptx
@@ -5,7 +5,7 @@
     <p:sldMasterId id="2147483648" r:id="rId1"/>
   </p:sldMasterIdLst>
   <p:notesMasterIdLst>
-    <p:notesMasterId r:id="rId39"/>
+    <p:notesMasterId r:id="rId42"/>
   </p:notesMasterIdLst>
   <p:sldIdLst>
     <p:sldId id="256" r:id="rId2"/>
@@ -27,24 +27,27 @@
     <p:sldId id="290" r:id="rId18"/>
     <p:sldId id="279" r:id="rId19"/>
     <p:sldId id="292" r:id="rId20"/>
-    <p:sldId id="308" r:id="rId21"/>
-    <p:sldId id="294" r:id="rId22"/>
-    <p:sldId id="304" r:id="rId23"/>
-    <p:sldId id="298" r:id="rId24"/>
-    <p:sldId id="297" r:id="rId25"/>
-    <p:sldId id="300" r:id="rId26"/>
-    <p:sldId id="299" r:id="rId27"/>
-    <p:sldId id="293" r:id="rId28"/>
-    <p:sldId id="302" r:id="rId29"/>
-    <p:sldId id="303" r:id="rId30"/>
-    <p:sldId id="301" r:id="rId31"/>
-    <p:sldId id="286" r:id="rId32"/>
-    <p:sldId id="305" r:id="rId33"/>
-    <p:sldId id="306" r:id="rId34"/>
-    <p:sldId id="274" r:id="rId35"/>
-    <p:sldId id="275" r:id="rId36"/>
-    <p:sldId id="276" r:id="rId37"/>
-    <p:sldId id="288" r:id="rId38"/>
+    <p:sldId id="309" r:id="rId21"/>
+    <p:sldId id="310" r:id="rId22"/>
+    <p:sldId id="311" r:id="rId23"/>
+    <p:sldId id="308" r:id="rId24"/>
+    <p:sldId id="294" r:id="rId25"/>
+    <p:sldId id="304" r:id="rId26"/>
+    <p:sldId id="298" r:id="rId27"/>
+    <p:sldId id="297" r:id="rId28"/>
+    <p:sldId id="300" r:id="rId29"/>
+    <p:sldId id="299" r:id="rId30"/>
+    <p:sldId id="293" r:id="rId31"/>
+    <p:sldId id="302" r:id="rId32"/>
+    <p:sldId id="303" r:id="rId33"/>
+    <p:sldId id="301" r:id="rId34"/>
+    <p:sldId id="286" r:id="rId35"/>
+    <p:sldId id="305" r:id="rId36"/>
+    <p:sldId id="306" r:id="rId37"/>
+    <p:sldId id="274" r:id="rId38"/>
+    <p:sldId id="275" r:id="rId39"/>
+    <p:sldId id="276" r:id="rId40"/>
+    <p:sldId id="288" r:id="rId41"/>
   </p:sldIdLst>
   <p:sldSz cx="12192000" cy="6858000"/>
   <p:notesSz cx="6858000" cy="9144000"/>
@@ -818,7 +821,7 @@
           <a:p>
             <a:fld id="{A2BA52DA-B0BC-A24E-B717-007855D4CE0B}" type="slidenum">
               <a:rPr lang="en-US" smtClean="0"/>
-              <a:t>28</a:t>
+              <a:t>31</a:t>
             </a:fld>
             <a:endParaRPr lang="en-US"/>
           </a:p>
@@ -902,7 +905,7 @@
           <a:p>
             <a:fld id="{A2BA52DA-B0BC-A24E-B717-007855D4CE0B}" type="slidenum">
               <a:rPr lang="en-US" smtClean="0"/>
-              <a:t>29</a:t>
+              <a:t>32</a:t>
             </a:fld>
             <a:endParaRPr lang="en-US"/>
           </a:p>
@@ -986,7 +989,7 @@
           <a:p>
             <a:fld id="{A2BA52DA-B0BC-A24E-B717-007855D4CE0B}" type="slidenum">
               <a:rPr lang="en-US" smtClean="0"/>
-              <a:t>35</a:t>
+              <a:t>38</a:t>
             </a:fld>
             <a:endParaRPr lang="en-US"/>
           </a:p>
@@ -1070,7 +1073,7 @@
           <a:p>
             <a:fld id="{A2BA52DA-B0BC-A24E-B717-007855D4CE0B}" type="slidenum">
               <a:rPr lang="en-US" smtClean="0"/>
-              <a:t>36</a:t>
+              <a:t>39</a:t>
             </a:fld>
             <a:endParaRPr lang="en-US"/>
           </a:p>
@@ -1154,7 +1157,7 @@
           <a:p>
             <a:fld id="{A2BA52DA-B0BC-A24E-B717-007855D4CE0B}" type="slidenum">
               <a:rPr lang="en-US" smtClean="0"/>
-              <a:t>37</a:t>
+              <a:t>40</a:t>
             </a:fld>
             <a:endParaRPr lang="en-US"/>
           </a:p>
@@ -6799,7 +6802,7 @@
         <p:spPr>
           <a:xfrm>
             <a:off x="0" y="-38100"/>
-            <a:ext cx="12005953" cy="2462213"/>
+            <a:ext cx="12005953" cy="1969770"/>
           </a:xfrm>
           <a:prstGeom prst="rect">
             <a:avLst/>
@@ -6830,58 +6833,13 @@
           </a:p>
           <a:p>
             <a:r>
-              <a:rPr lang="en-US" sz="1600" dirty="0" smtClean="0">
-                <a:latin typeface="Arial" charset="0"/>
-                <a:ea typeface="Arial" charset="0"/>
-                <a:cs typeface="Arial" charset="0"/>
-              </a:rPr>
-              <a:t>I fit each model to the behavioral data of </a:t>
-            </a:r>
-            <a:r>
-              <a:rPr lang="en-US" sz="1600" dirty="0" smtClean="0">
-                <a:latin typeface="Arial" charset="0"/>
-                <a:ea typeface="Arial" charset="0"/>
-                <a:cs typeface="Arial" charset="0"/>
-              </a:rPr>
-              <a:t>the fMRI dataset using </a:t>
-            </a:r>
-            <a:r>
-              <a:rPr lang="en-US" sz="1600" dirty="0" err="1" smtClean="0">
-                <a:latin typeface="Arial" charset="0"/>
-                <a:ea typeface="Arial" charset="0"/>
-                <a:cs typeface="Arial" charset="0"/>
-              </a:rPr>
-              <a:t>Variational</a:t>
-            </a:r>
-            <a:r>
-              <a:rPr lang="en-US" sz="1600" dirty="0" smtClean="0">
-                <a:latin typeface="Arial" charset="0"/>
-                <a:ea typeface="Arial" charset="0"/>
-                <a:cs typeface="Arial" charset="0"/>
-              </a:rPr>
-              <a:t> Bayesian Analysis implemented in the VBA toolbox </a:t>
+              <a:rPr lang="en-US" sz="1600" dirty="0" smtClean="0"/>
+              <a:t>The left plot is model fits to predator data, and the right plot are model fits to prey data. The top row is </a:t>
             </a:r>
             <a:r>
               <a:rPr lang="en-US" sz="1600" dirty="0"/>
-              <a:t>(</a:t>
-            </a:r>
-            <a:r>
-              <a:rPr lang="en-US" sz="1600" dirty="0" err="1"/>
-              <a:t>Daunizeau</a:t>
-            </a:r>
-            <a:r>
-              <a:rPr lang="en-US" sz="1600" dirty="0"/>
-              <a:t> et al., 2014</a:t>
-            </a:r>
-            <a:r>
-              <a:rPr lang="en-US" sz="1600" dirty="0" smtClean="0"/>
-              <a:t>). The left plot is model fits to predator data, and the right plot are model fits to prey data. The middle left panel in each plot indicates the evidence in favor of each model as result of random effect analysis across subjects. As can be seen, for predators model 2 is the clear winner, while the results of prey are more ambiguous. While in prey model 2 does have the highest exceedance probability by a wide margin, model also has some evidence. </a:t>
-            </a:r>
-            <a:endParaRPr lang="en-US" sz="1600" dirty="0" smtClean="0">
-              <a:latin typeface="Arial" charset="0"/>
-              <a:ea typeface="Arial" charset="0"/>
-              <a:cs typeface="Arial" charset="0"/>
-            </a:endParaRPr>
+              <a:t>the result of a fixed effect analysis in which BIC’s were summed across subjects. Lower BIC indicates better fit to the data. As can be seen, (more clearly or predators than for prey), model 2 wins in both cases (albeit by a very slim margin).</a:t>
+            </a:r>
           </a:p>
           <a:p>
             <a:endParaRPr lang="en-US" dirty="0" smtClean="0"/>
@@ -6891,88 +6849,59 @@
           </a:p>
         </p:txBody>
       </p:sp>
+      <p:pic>
+        <p:nvPicPr>
+          <p:cNvPr id="14" name="Picture 13"/>
+          <p:cNvPicPr>
+            <a:picLocks noChangeAspect="1"/>
+          </p:cNvPicPr>
+          <p:nvPr/>
+        </p:nvPicPr>
+        <p:blipFill rotWithShape="1">
+          <a:blip r:embed="rId3">
+            <a:extLst>
+              <a:ext uri="{28A0092B-C50C-407E-A947-70E740481C1C}">
+                <a14:useLocalDpi xmlns:a14="http://schemas.microsoft.com/office/drawing/2010/main" val="0"/>
+              </a:ext>
+            </a:extLst>
+          </a:blip>
+          <a:srcRect l="4560" t="33923" r="48270" b="36668"/>
+          <a:stretch/>
+        </p:blipFill>
+        <p:spPr>
+          <a:xfrm>
+            <a:off x="8899685" y="4326627"/>
+            <a:ext cx="2963860" cy="2164434"/>
+          </a:xfrm>
+          <a:prstGeom prst="rect">
+            <a:avLst/>
+          </a:prstGeom>
+        </p:spPr>
+      </p:pic>
       <p:grpSp>
         <p:nvGrpSpPr>
-          <p:cNvPr id="23" name="Group 22"/>
+          <p:cNvPr id="30" name="Group 29"/>
           <p:cNvGrpSpPr/>
           <p:nvPr/>
         </p:nvGrpSpPr>
         <p:grpSpPr>
           <a:xfrm>
-            <a:off x="3536387" y="1834419"/>
-            <a:ext cx="8655613" cy="4886696"/>
-            <a:chOff x="3236660" y="69119"/>
-            <a:chExt cx="8655613" cy="4886696"/>
+            <a:off x="9228140" y="2253713"/>
+            <a:ext cx="2635405" cy="1924243"/>
+            <a:chOff x="9366731" y="4600355"/>
+            <a:chExt cx="2635405" cy="1924243"/>
           </a:xfrm>
         </p:grpSpPr>
         <p:pic>
           <p:nvPicPr>
-            <p:cNvPr id="3" name="Picture 2"/>
-            <p:cNvPicPr>
-              <a:picLocks noChangeAspect="1"/>
-            </p:cNvPicPr>
-            <p:nvPr/>
-          </p:nvPicPr>
-          <p:blipFill rotWithShape="1">
-            <a:blip r:embed="rId3">
-              <a:extLst>
-                <a:ext uri="{28A0092B-C50C-407E-A947-70E740481C1C}">
-                  <a14:useLocalDpi xmlns:a14="http://schemas.microsoft.com/office/drawing/2010/main" val="0"/>
-                </a:ext>
-              </a:extLst>
-            </a:blip>
-            <a:srcRect t="4396"/>
-            <a:stretch/>
-          </p:blipFill>
-          <p:spPr>
-            <a:xfrm>
-              <a:off x="3236660" y="152245"/>
-              <a:ext cx="4289644" cy="4803569"/>
-            </a:xfrm>
-            <a:prstGeom prst="rect">
-              <a:avLst/>
-            </a:prstGeom>
-          </p:spPr>
-        </p:pic>
-        <p:pic>
-          <p:nvPicPr>
-            <p:cNvPr id="14" name="Picture 13"/>
-            <p:cNvPicPr>
-              <a:picLocks noChangeAspect="1"/>
-            </p:cNvPicPr>
-            <p:nvPr/>
-          </p:nvPicPr>
-          <p:blipFill rotWithShape="1">
-            <a:blip r:embed="rId4">
-              <a:extLst>
-                <a:ext uri="{28A0092B-C50C-407E-A947-70E740481C1C}">
-                  <a14:useLocalDpi xmlns:a14="http://schemas.microsoft.com/office/drawing/2010/main" val="0"/>
-                </a:ext>
-              </a:extLst>
-            </a:blip>
-            <a:srcRect t="2741"/>
-            <a:stretch/>
-          </p:blipFill>
-          <p:spPr>
-            <a:xfrm>
-              <a:off x="7361204" y="69119"/>
-              <a:ext cx="4289644" cy="4886696"/>
-            </a:xfrm>
-            <a:prstGeom prst="rect">
-              <a:avLst/>
-            </a:prstGeom>
-          </p:spPr>
-        </p:pic>
-        <p:pic>
-          <p:nvPicPr>
-            <p:cNvPr id="15" name="Picture 14"/>
+            <p:cNvPr id="16" name="Picture 15"/>
             <p:cNvPicPr>
               <a:picLocks noChangeAspect="1"/>
             </p:cNvPicPr>
             <p:nvPr/>
           </p:nvPicPr>
           <p:blipFill>
-            <a:blip r:embed="rId5">
+            <a:blip r:embed="rId4">
               <a:extLst>
                 <a:ext uri="{28A0092B-C50C-407E-A947-70E740481C1C}">
                   <a14:useLocalDpi xmlns:a14="http://schemas.microsoft.com/office/drawing/2010/main" val="0"/>
@@ -6985,38 +6914,8 @@
           </p:blipFill>
           <p:spPr>
             <a:xfrm>
-              <a:off x="5402351" y="3113466"/>
-              <a:ext cx="2218955" cy="1664217"/>
-            </a:xfrm>
-            <a:prstGeom prst="rect">
-              <a:avLst/>
-            </a:prstGeom>
-          </p:spPr>
-        </p:pic>
-        <p:pic>
-          <p:nvPicPr>
-            <p:cNvPr id="16" name="Picture 15"/>
-            <p:cNvPicPr>
-              <a:picLocks noChangeAspect="1"/>
-            </p:cNvPicPr>
-            <p:nvPr/>
-          </p:nvPicPr>
-          <p:blipFill>
-            <a:blip r:embed="rId6">
-              <a:extLst>
-                <a:ext uri="{28A0092B-C50C-407E-A947-70E740481C1C}">
-                  <a14:useLocalDpi xmlns:a14="http://schemas.microsoft.com/office/drawing/2010/main" val="0"/>
-                </a:ext>
-              </a:extLst>
-            </a:blip>
-            <a:stretch>
-              <a:fillRect/>
-            </a:stretch>
-          </p:blipFill>
-          <p:spPr>
-            <a:xfrm>
-              <a:off x="9673318" y="3113465"/>
-              <a:ext cx="2218955" cy="1664217"/>
+              <a:off x="9366731" y="4600355"/>
+              <a:ext cx="2635405" cy="1924243"/>
             </a:xfrm>
             <a:prstGeom prst="rect">
               <a:avLst/>
@@ -7025,49 +6924,14 @@
         </p:pic>
         <p:cxnSp>
           <p:nvCxnSpPr>
-            <p:cNvPr id="37" name="Straight Connector 36"/>
-            <p:cNvCxnSpPr/>
-            <p:nvPr/>
-          </p:nvCxnSpPr>
-          <p:spPr>
-            <a:xfrm>
-              <a:off x="5679904" y="3456508"/>
-              <a:ext cx="1752916" cy="3794"/>
-            </a:xfrm>
-            <a:prstGeom prst="line">
-              <a:avLst/>
-            </a:prstGeom>
-            <a:ln w="0">
-              <a:solidFill>
-                <a:srgbClr val="FF0000"/>
-              </a:solidFill>
-            </a:ln>
-          </p:spPr>
-          <p:style>
-            <a:lnRef idx="1">
-              <a:schemeClr val="accent1"/>
-            </a:lnRef>
-            <a:fillRef idx="0">
-              <a:schemeClr val="accent1"/>
-            </a:fillRef>
-            <a:effectRef idx="0">
-              <a:schemeClr val="accent1"/>
-            </a:effectRef>
-            <a:fontRef idx="minor">
-              <a:schemeClr val="tx1"/>
-            </a:fontRef>
-          </p:style>
-        </p:cxnSp>
-        <p:cxnSp>
-          <p:nvCxnSpPr>
             <p:cNvPr id="41" name="Straight Connector 40"/>
             <p:cNvCxnSpPr/>
             <p:nvPr/>
           </p:nvCxnSpPr>
           <p:spPr>
             <a:xfrm>
-              <a:off x="9949493" y="3293549"/>
-              <a:ext cx="1752916" cy="3794"/>
+              <a:off x="9694738" y="4808576"/>
+              <a:ext cx="2081901" cy="4387"/>
             </a:xfrm>
             <a:prstGeom prst="line">
               <a:avLst/>
@@ -7103,7 +6967,7 @@
         <p:spPr>
           <a:xfrm>
             <a:off x="31688" y="1922464"/>
-            <a:ext cx="3873500" cy="3046988"/>
+            <a:ext cx="3873500" cy="3785652"/>
           </a:xfrm>
           <a:prstGeom prst="rect">
             <a:avLst/>
@@ -7116,10 +6980,61 @@
           </a:bodyPr>
           <a:lstStyle/>
           <a:p>
+            <a:endParaRPr lang="en-US" sz="1600" dirty="0"/>
+          </a:p>
+          <a:p>
+            <a:r>
+              <a:rPr lang="en-US" sz="1600" dirty="0"/>
+              <a:t>The bottom row indicates the evidence in favor of each model as result of random effect analysis across </a:t>
+            </a:r>
             <a:r>
               <a:rPr lang="en-US" sz="1600" dirty="0" smtClean="0"/>
-              <a:t>In the lower right hand panel of both plots is the result of a fixed effect analysis in which BIC’s were summed across subjects. Lower BIC indicates better fit to the data. As can be seen, (more clearly or predators than for prey), model 2 wins in both cases (albeit by a very slim margin).</a:t>
-            </a:r>
+              <a:t>subjects using </a:t>
+            </a:r>
+            <a:r>
+              <a:rPr lang="en-US" sz="1600" dirty="0" err="1">
+                <a:latin typeface="Arial" charset="0"/>
+                <a:ea typeface="Arial" charset="0"/>
+                <a:cs typeface="Arial" charset="0"/>
+              </a:rPr>
+              <a:t>Variational</a:t>
+            </a:r>
+            <a:r>
+              <a:rPr lang="en-US" sz="1600" dirty="0">
+                <a:latin typeface="Arial" charset="0"/>
+                <a:ea typeface="Arial" charset="0"/>
+                <a:cs typeface="Arial" charset="0"/>
+              </a:rPr>
+              <a:t> Bayesian Analysis implemented in the VBA toolbox </a:t>
+            </a:r>
+            <a:r>
+              <a:rPr lang="en-US" sz="1600" dirty="0"/>
+              <a:t>(</a:t>
+            </a:r>
+            <a:r>
+              <a:rPr lang="en-US" sz="1600" dirty="0" err="1"/>
+              <a:t>Daunizeau</a:t>
+            </a:r>
+            <a:r>
+              <a:rPr lang="en-US" sz="1600" dirty="0"/>
+              <a:t> et al., 2014</a:t>
+            </a:r>
+            <a:r>
+              <a:rPr lang="en-US" sz="1600" dirty="0" smtClean="0"/>
+              <a:t>). </a:t>
+            </a:r>
+            <a:r>
+              <a:rPr lang="en-US" sz="1600" dirty="0"/>
+              <a:t>As can be seen, for predators model 2 is the clear winner, while the results of prey are more ambiguous. </a:t>
+            </a:r>
+            <a:endParaRPr lang="en-US" sz="1600" dirty="0">
+              <a:latin typeface="Arial" charset="0"/>
+              <a:ea typeface="Arial" charset="0"/>
+              <a:cs typeface="Arial" charset="0"/>
+            </a:endParaRPr>
+          </a:p>
+          <a:p>
+            <a:endParaRPr lang="en-US" sz="1600" dirty="0" smtClean="0"/>
           </a:p>
           <a:p>
             <a:endParaRPr lang="en-US" sz="1600" dirty="0"/>
@@ -7135,11 +7050,7 @@
             </a:r>
             <a:r>
               <a:rPr lang="en-US" sz="1600" dirty="0" smtClean="0"/>
-              <a:t> make these plots in ggplot2 if we decide to stick with </a:t>
-            </a:r>
-            <a:r>
-              <a:rPr lang="en-US" sz="1600" smtClean="0"/>
-              <a:t>this analysis, need to have values at the top</a:t>
+              <a:t> make these plots in ggplot2 if we decide to stick with this analysis, need to have values at the top</a:t>
             </a:r>
             <a:endParaRPr lang="en-US" sz="1600" dirty="0"/>
           </a:p>
@@ -7147,13 +7058,72 @@
       </p:sp>
       <p:sp>
         <p:nvSpPr>
-          <p:cNvPr id="25" name="TextBox 24"/>
+          <p:cNvPr id="45" name="TextBox 44"/>
           <p:cNvSpPr txBox="1"/>
           <p:nvPr/>
         </p:nvSpPr>
         <p:spPr>
           <a:xfrm>
-            <a:off x="6247526" y="1834419"/>
+            <a:off x="11034565" y="1808781"/>
+            <a:ext cx="659155" cy="369332"/>
+          </a:xfrm>
+          <a:prstGeom prst="rect">
+            <a:avLst/>
+          </a:prstGeom>
+          <a:noFill/>
+        </p:spPr>
+        <p:txBody>
+          <a:bodyPr wrap="none" rtlCol="0">
+            <a:spAutoFit/>
+          </a:bodyPr>
+          <a:lstStyle/>
+          <a:p>
+            <a:r>
+              <a:rPr lang="en-US" dirty="0" smtClean="0"/>
+              <a:t>Prey</a:t>
+            </a:r>
+            <a:endParaRPr lang="en-US" dirty="0"/>
+          </a:p>
+        </p:txBody>
+      </p:sp>
+      <p:pic>
+        <p:nvPicPr>
+          <p:cNvPr id="26" name="Picture 25"/>
+          <p:cNvPicPr>
+            <a:picLocks noChangeAspect="1"/>
+          </p:cNvPicPr>
+          <p:nvPr/>
+        </p:nvPicPr>
+        <p:blipFill rotWithShape="1">
+          <a:blip r:embed="rId5">
+            <a:extLst>
+              <a:ext uri="{28A0092B-C50C-407E-A947-70E740481C1C}">
+                <a14:useLocalDpi xmlns:a14="http://schemas.microsoft.com/office/drawing/2010/main" val="0"/>
+              </a:ext>
+            </a:extLst>
+          </a:blip>
+          <a:srcRect l="6843" t="34159" r="48356" b="35309"/>
+          <a:stretch/>
+        </p:blipFill>
+        <p:spPr>
+          <a:xfrm>
+            <a:off x="5431943" y="4271207"/>
+            <a:ext cx="3021981" cy="2412297"/>
+          </a:xfrm>
+          <a:prstGeom prst="rect">
+            <a:avLst/>
+          </a:prstGeom>
+        </p:spPr>
+      </p:pic>
+      <p:sp>
+        <p:nvSpPr>
+          <p:cNvPr id="47" name="TextBox 46"/>
+          <p:cNvSpPr txBox="1"/>
+          <p:nvPr/>
+        </p:nvSpPr>
+        <p:spPr>
+          <a:xfrm>
+            <a:off x="6723473" y="1834419"/>
             <a:ext cx="1069524" cy="369332"/>
           </a:xfrm>
           <a:prstGeom prst="rect">
@@ -7175,36 +7145,86 @@
           </a:p>
         </p:txBody>
       </p:sp>
-      <p:sp>
-        <p:nvSpPr>
-          <p:cNvPr id="45" name="TextBox 44"/>
-          <p:cNvSpPr txBox="1"/>
+      <p:grpSp>
+        <p:nvGrpSpPr>
+          <p:cNvPr id="29" name="Group 28"/>
+          <p:cNvGrpSpPr/>
           <p:nvPr/>
-        </p:nvSpPr>
-        <p:spPr>
+        </p:nvGrpSpPr>
+        <p:grpSpPr>
           <a:xfrm>
-            <a:off x="10425618" y="1732879"/>
-            <a:ext cx="659155" cy="369332"/>
+            <a:off x="5488712" y="2223067"/>
+            <a:ext cx="2699279" cy="2035600"/>
+            <a:chOff x="5627303" y="4637589"/>
+            <a:chExt cx="2623625" cy="1967719"/>
           </a:xfrm>
-          <a:prstGeom prst="rect">
-            <a:avLst/>
-          </a:prstGeom>
-          <a:noFill/>
-        </p:spPr>
-        <p:txBody>
-          <a:bodyPr wrap="none" rtlCol="0">
-            <a:spAutoFit/>
-          </a:bodyPr>
-          <a:lstStyle/>
-          <a:p>
-            <a:r>
-              <a:rPr lang="en-US" dirty="0" smtClean="0"/>
-              <a:t>Prey</a:t>
-            </a:r>
-            <a:endParaRPr lang="en-US" dirty="0"/>
-          </a:p>
-        </p:txBody>
-      </p:sp>
+        </p:grpSpPr>
+        <p:pic>
+          <p:nvPicPr>
+            <p:cNvPr id="28" name="Picture 27"/>
+            <p:cNvPicPr>
+              <a:picLocks noChangeAspect="1"/>
+            </p:cNvPicPr>
+            <p:nvPr/>
+          </p:nvPicPr>
+          <p:blipFill>
+            <a:blip r:embed="rId6">
+              <a:extLst>
+                <a:ext uri="{28A0092B-C50C-407E-A947-70E740481C1C}">
+                  <a14:useLocalDpi xmlns:a14="http://schemas.microsoft.com/office/drawing/2010/main" val="0"/>
+                </a:ext>
+              </a:extLst>
+            </a:blip>
+            <a:stretch>
+              <a:fillRect/>
+            </a:stretch>
+          </p:blipFill>
+          <p:spPr>
+            <a:xfrm>
+              <a:off x="5627303" y="4637589"/>
+              <a:ext cx="2623625" cy="1967719"/>
+            </a:xfrm>
+            <a:prstGeom prst="rect">
+              <a:avLst/>
+            </a:prstGeom>
+          </p:spPr>
+        </p:pic>
+        <p:cxnSp>
+          <p:nvCxnSpPr>
+            <p:cNvPr id="50" name="Straight Connector 49"/>
+            <p:cNvCxnSpPr/>
+            <p:nvPr/>
+          </p:nvCxnSpPr>
+          <p:spPr>
+            <a:xfrm>
+              <a:off x="5934736" y="5025167"/>
+              <a:ext cx="2081901" cy="4387"/>
+            </a:xfrm>
+            <a:prstGeom prst="line">
+              <a:avLst/>
+            </a:prstGeom>
+            <a:ln w="0">
+              <a:solidFill>
+                <a:srgbClr val="FF0000"/>
+              </a:solidFill>
+            </a:ln>
+          </p:spPr>
+          <p:style>
+            <a:lnRef idx="1">
+              <a:schemeClr val="accent1"/>
+            </a:lnRef>
+            <a:fillRef idx="0">
+              <a:schemeClr val="accent1"/>
+            </a:fillRef>
+            <a:effectRef idx="0">
+              <a:schemeClr val="accent1"/>
+            </a:effectRef>
+            <a:fontRef idx="minor">
+              <a:schemeClr val="tx1"/>
+            </a:fontRef>
+          </p:style>
+        </p:cxnSp>
+      </p:grpSp>
     </p:spTree>
     <p:extLst>
       <p:ext uri="{BB962C8B-B14F-4D97-AF65-F5344CB8AC3E}">
@@ -7389,6 +7409,1164 @@
 </file>
 
 <file path=ppt/slides/slide20.xml><?xml version="1.0" encoding="utf-8"?>
+<p:sld xmlns:a="http://schemas.openxmlformats.org/drawingml/2006/main" xmlns:r="http://schemas.openxmlformats.org/officeDocument/2006/relationships" xmlns:p="http://schemas.openxmlformats.org/presentationml/2006/main">
+  <p:cSld>
+    <p:spTree>
+      <p:nvGrpSpPr>
+        <p:cNvPr id="1" name=""/>
+        <p:cNvGrpSpPr/>
+        <p:nvPr/>
+      </p:nvGrpSpPr>
+      <p:grpSpPr>
+        <a:xfrm>
+          <a:off x="0" y="0"/>
+          <a:ext cx="0" cy="0"/>
+          <a:chOff x="0" y="0"/>
+          <a:chExt cx="0" cy="0"/>
+        </a:xfrm>
+      </p:grpSpPr>
+      <p:sp>
+        <p:nvSpPr>
+          <p:cNvPr id="4" name="Rectangle 3"/>
+          <p:cNvSpPr/>
+          <p:nvPr/>
+        </p:nvSpPr>
+        <p:spPr>
+          <a:xfrm>
+            <a:off x="0" y="-158222"/>
+            <a:ext cx="11756571" cy="6617196"/>
+          </a:xfrm>
+          <a:prstGeom prst="rect">
+            <a:avLst/>
+          </a:prstGeom>
+        </p:spPr>
+        <p:txBody>
+          <a:bodyPr wrap="square">
+            <a:spAutoFit/>
+          </a:bodyPr>
+          <a:lstStyle/>
+          <a:p>
+            <a:pPr>
+              <a:lnSpc>
+                <a:spcPct val="200000"/>
+              </a:lnSpc>
+            </a:pPr>
+            <a:r>
+              <a:rPr lang="en-US" sz="2000" b="1" dirty="0" smtClean="0">
+                <a:latin typeface="Arial" charset="0"/>
+                <a:ea typeface="Arial" charset="0"/>
+                <a:cs typeface="Arial" charset="0"/>
+              </a:rPr>
+              <a:t>Findings</a:t>
+            </a:r>
+            <a:endParaRPr lang="en-US" sz="1600" dirty="0" smtClean="0">
+              <a:latin typeface="Arial" charset="0"/>
+              <a:ea typeface="Arial" charset="0"/>
+              <a:cs typeface="Arial" charset="0"/>
+            </a:endParaRPr>
+          </a:p>
+          <a:p>
+            <a:pPr>
+              <a:lnSpc>
+                <a:spcPct val="200000"/>
+              </a:lnSpc>
+            </a:pPr>
+            <a:r>
+              <a:rPr lang="en-US" sz="1600" dirty="0" smtClean="0">
+                <a:latin typeface="Arial" charset="0"/>
+                <a:ea typeface="Arial" charset="0"/>
+                <a:cs typeface="Arial" charset="0"/>
+              </a:rPr>
+              <a:t>I then used as parametric </a:t>
+            </a:r>
+            <a:r>
+              <a:rPr lang="en-US" sz="1600" dirty="0" err="1" smtClean="0">
+                <a:latin typeface="Arial" charset="0"/>
+                <a:ea typeface="Arial" charset="0"/>
+                <a:cs typeface="Arial" charset="0"/>
+              </a:rPr>
+              <a:t>regressors</a:t>
+            </a:r>
+            <a:r>
+              <a:rPr lang="en-US" sz="1600" dirty="0" smtClean="0">
+                <a:latin typeface="Arial" charset="0"/>
+                <a:ea typeface="Arial" charset="0"/>
+                <a:cs typeface="Arial" charset="0"/>
+              </a:rPr>
+              <a:t>: expected value, expected risk (with a 5 second delay as recommended by </a:t>
+            </a:r>
+            <a:r>
+              <a:rPr lang="en-US" sz="1600" dirty="0" err="1" smtClean="0">
+                <a:latin typeface="Arial" charset="0"/>
+                <a:ea typeface="Arial" charset="0"/>
+                <a:cs typeface="Arial" charset="0"/>
+              </a:rPr>
+              <a:t>Preuschoff</a:t>
+            </a:r>
+            <a:r>
+              <a:rPr lang="en-US" sz="1600" dirty="0" smtClean="0">
+                <a:latin typeface="Arial" charset="0"/>
+                <a:ea typeface="Arial" charset="0"/>
+                <a:cs typeface="Arial" charset="0"/>
+              </a:rPr>
+              <a:t> et al., 2008), prediction error, and risk prediction error. What I found is:</a:t>
+            </a:r>
+          </a:p>
+          <a:p>
+            <a:pPr>
+              <a:lnSpc>
+                <a:spcPct val="200000"/>
+              </a:lnSpc>
+            </a:pPr>
+            <a:r>
+              <a:rPr lang="en-US" sz="1600" dirty="0" smtClean="0">
+                <a:latin typeface="Arial" charset="0"/>
+                <a:ea typeface="Arial" charset="0"/>
+                <a:cs typeface="Arial" charset="0"/>
+              </a:rPr>
+              <a:t>Expected Reward/ prediction errors (expected reward in selection and prediction errors in feedback)</a:t>
+            </a:r>
+          </a:p>
+          <a:p>
+            <a:pPr>
+              <a:lnSpc>
+                <a:spcPct val="200000"/>
+              </a:lnSpc>
+            </a:pPr>
+            <a:r>
+              <a:rPr lang="en-US" sz="1600" dirty="0">
+                <a:latin typeface="Arial" charset="0"/>
+                <a:ea typeface="Arial" charset="0"/>
+                <a:cs typeface="Arial" charset="0"/>
+              </a:rPr>
+              <a:t>	</a:t>
+            </a:r>
+            <a:r>
+              <a:rPr lang="en-US" sz="1600" dirty="0" smtClean="0">
+                <a:latin typeface="Arial" charset="0"/>
+                <a:ea typeface="Arial" charset="0"/>
+                <a:cs typeface="Arial" charset="0"/>
+              </a:rPr>
+              <a:t>Predator feedback</a:t>
+            </a:r>
+          </a:p>
+          <a:p>
+            <a:pPr>
+              <a:lnSpc>
+                <a:spcPct val="200000"/>
+              </a:lnSpc>
+            </a:pPr>
+            <a:r>
+              <a:rPr lang="en-US" sz="1600" dirty="0">
+                <a:latin typeface="Arial" charset="0"/>
+                <a:ea typeface="Arial" charset="0"/>
+                <a:cs typeface="Arial" charset="0"/>
+              </a:rPr>
+              <a:t>	</a:t>
+            </a:r>
+            <a:r>
+              <a:rPr lang="en-US" sz="1600" dirty="0" smtClean="0">
+                <a:latin typeface="Arial" charset="0"/>
+                <a:ea typeface="Arial" charset="0"/>
+                <a:cs typeface="Arial" charset="0"/>
+              </a:rPr>
+              <a:t>	Nothing</a:t>
+            </a:r>
+          </a:p>
+          <a:p>
+            <a:pPr>
+              <a:lnSpc>
+                <a:spcPct val="200000"/>
+              </a:lnSpc>
+            </a:pPr>
+            <a:r>
+              <a:rPr lang="en-US" sz="1600" dirty="0">
+                <a:latin typeface="Arial" charset="0"/>
+                <a:ea typeface="Arial" charset="0"/>
+                <a:cs typeface="Arial" charset="0"/>
+              </a:rPr>
+              <a:t>	</a:t>
+            </a:r>
+            <a:r>
+              <a:rPr lang="en-US" sz="1600" dirty="0" smtClean="0">
+                <a:latin typeface="Arial" charset="0"/>
+                <a:ea typeface="Arial" charset="0"/>
+                <a:cs typeface="Arial" charset="0"/>
+              </a:rPr>
+              <a:t>Prey feedback</a:t>
+            </a:r>
+          </a:p>
+          <a:p>
+            <a:pPr>
+              <a:lnSpc>
+                <a:spcPct val="200000"/>
+              </a:lnSpc>
+            </a:pPr>
+            <a:r>
+              <a:rPr lang="en-US" sz="1600" dirty="0">
+                <a:latin typeface="Arial" charset="0"/>
+                <a:ea typeface="Arial" charset="0"/>
+                <a:cs typeface="Arial" charset="0"/>
+              </a:rPr>
+              <a:t>	</a:t>
+            </a:r>
+            <a:r>
+              <a:rPr lang="en-US" sz="1600" dirty="0" smtClean="0">
+                <a:latin typeface="Arial" charset="0"/>
+                <a:ea typeface="Arial" charset="0"/>
+                <a:cs typeface="Arial" charset="0"/>
+              </a:rPr>
+              <a:t>	VMPFC: </a:t>
+            </a:r>
+            <a:r>
+              <a:rPr lang="en-US" sz="1600" i="1" dirty="0" smtClean="0">
+                <a:latin typeface="Arial" charset="0"/>
+                <a:ea typeface="Arial" charset="0"/>
+                <a:cs typeface="Arial" charset="0"/>
+              </a:rPr>
+              <a:t>p</a:t>
+            </a:r>
+            <a:r>
+              <a:rPr lang="en-US" sz="1600" dirty="0" smtClean="0">
+                <a:latin typeface="Arial" charset="0"/>
+                <a:ea typeface="Arial" charset="0"/>
+                <a:cs typeface="Arial" charset="0"/>
+              </a:rPr>
+              <a:t>=0.0706</a:t>
+            </a:r>
+          </a:p>
+          <a:p>
+            <a:pPr>
+              <a:lnSpc>
+                <a:spcPct val="200000"/>
+              </a:lnSpc>
+            </a:pPr>
+            <a:r>
+              <a:rPr lang="en-US" sz="1600" dirty="0">
+                <a:latin typeface="Arial" charset="0"/>
+                <a:ea typeface="Arial" charset="0"/>
+                <a:cs typeface="Arial" charset="0"/>
+              </a:rPr>
+              <a:t>	</a:t>
+            </a:r>
+            <a:r>
+              <a:rPr lang="en-US" sz="1600" dirty="0" smtClean="0">
+                <a:latin typeface="Arial" charset="0"/>
+                <a:ea typeface="Arial" charset="0"/>
+                <a:cs typeface="Arial" charset="0"/>
+              </a:rPr>
+              <a:t>Predator selection</a:t>
+            </a:r>
+          </a:p>
+          <a:p>
+            <a:pPr>
+              <a:lnSpc>
+                <a:spcPct val="200000"/>
+              </a:lnSpc>
+            </a:pPr>
+            <a:r>
+              <a:rPr lang="en-US" sz="1600" dirty="0">
+                <a:latin typeface="Arial" charset="0"/>
+                <a:ea typeface="Arial" charset="0"/>
+                <a:cs typeface="Arial" charset="0"/>
+              </a:rPr>
+              <a:t>	</a:t>
+            </a:r>
+            <a:r>
+              <a:rPr lang="en-US" sz="1600" dirty="0" smtClean="0">
+                <a:latin typeface="Arial" charset="0"/>
+                <a:ea typeface="Arial" charset="0"/>
+                <a:cs typeface="Arial" charset="0"/>
+              </a:rPr>
+              <a:t>	Negative activation everywhere (not sure why or how this happened)</a:t>
+            </a:r>
+          </a:p>
+          <a:p>
+            <a:pPr>
+              <a:lnSpc>
+                <a:spcPct val="200000"/>
+              </a:lnSpc>
+            </a:pPr>
+            <a:r>
+              <a:rPr lang="en-US" sz="1600" dirty="0">
+                <a:latin typeface="Arial" charset="0"/>
+                <a:ea typeface="Arial" charset="0"/>
+                <a:cs typeface="Arial" charset="0"/>
+              </a:rPr>
+              <a:t>	</a:t>
+            </a:r>
+            <a:r>
+              <a:rPr lang="en-US" sz="1600" dirty="0" smtClean="0">
+                <a:latin typeface="Arial" charset="0"/>
+                <a:ea typeface="Arial" charset="0"/>
+                <a:cs typeface="Arial" charset="0"/>
+              </a:rPr>
+              <a:t>Prey selection</a:t>
+            </a:r>
+          </a:p>
+          <a:p>
+            <a:pPr>
+              <a:lnSpc>
+                <a:spcPct val="200000"/>
+              </a:lnSpc>
+            </a:pPr>
+            <a:r>
+              <a:rPr lang="en-US" sz="1600" dirty="0">
+                <a:latin typeface="Arial" charset="0"/>
+                <a:ea typeface="Arial" charset="0"/>
+                <a:cs typeface="Arial" charset="0"/>
+              </a:rPr>
+              <a:t>	</a:t>
+            </a:r>
+            <a:r>
+              <a:rPr lang="en-US" sz="1600" dirty="0" smtClean="0">
+                <a:latin typeface="Arial" charset="0"/>
+                <a:ea typeface="Arial" charset="0"/>
+                <a:cs typeface="Arial" charset="0"/>
+              </a:rPr>
+              <a:t>	Nothing</a:t>
+            </a:r>
+          </a:p>
+          <a:p>
+            <a:pPr>
+              <a:lnSpc>
+                <a:spcPct val="200000"/>
+              </a:lnSpc>
+            </a:pPr>
+            <a:r>
+              <a:rPr lang="en-US" sz="1600" dirty="0">
+                <a:latin typeface="Arial" charset="0"/>
+                <a:ea typeface="Arial" charset="0"/>
+                <a:cs typeface="Arial" charset="0"/>
+              </a:rPr>
+              <a:t>	</a:t>
+            </a:r>
+            <a:endParaRPr lang="en-US" sz="1600" dirty="0" smtClean="0">
+              <a:latin typeface="Arial" charset="0"/>
+              <a:ea typeface="Arial" charset="0"/>
+              <a:cs typeface="Arial" charset="0"/>
+            </a:endParaRPr>
+          </a:p>
+        </p:txBody>
+      </p:sp>
+    </p:spTree>
+    <p:extLst>
+      <p:ext uri="{BB962C8B-B14F-4D97-AF65-F5344CB8AC3E}">
+        <p14:creationId xmlns:p14="http://schemas.microsoft.com/office/powerpoint/2010/main" val="1306335158"/>
+      </p:ext>
+    </p:extLst>
+  </p:cSld>
+  <p:clrMapOvr>
+    <a:masterClrMapping/>
+  </p:clrMapOvr>
+  <p:timing>
+    <p:tnLst>
+      <p:par>
+        <p:cTn id="1" dur="indefinite" restart="never" nodeType="tmRoot"/>
+      </p:par>
+    </p:tnLst>
+  </p:timing>
+</p:sld>
+</file>
+
+<file path=ppt/slides/slide21.xml><?xml version="1.0" encoding="utf-8"?>
+<p:sld xmlns:a="http://schemas.openxmlformats.org/drawingml/2006/main" xmlns:r="http://schemas.openxmlformats.org/officeDocument/2006/relationships" xmlns:p="http://schemas.openxmlformats.org/presentationml/2006/main">
+  <p:cSld>
+    <p:spTree>
+      <p:nvGrpSpPr>
+        <p:cNvPr id="1" name=""/>
+        <p:cNvGrpSpPr/>
+        <p:nvPr/>
+      </p:nvGrpSpPr>
+      <p:grpSpPr>
+        <a:xfrm>
+          <a:off x="0" y="0"/>
+          <a:ext cx="0" cy="0"/>
+          <a:chOff x="0" y="0"/>
+          <a:chExt cx="0" cy="0"/>
+        </a:xfrm>
+      </p:grpSpPr>
+      <p:sp>
+        <p:nvSpPr>
+          <p:cNvPr id="4" name="Rectangle 3"/>
+          <p:cNvSpPr/>
+          <p:nvPr/>
+        </p:nvSpPr>
+        <p:spPr>
+          <a:xfrm>
+            <a:off x="0" y="-158222"/>
+            <a:ext cx="11756571" cy="7602081"/>
+          </a:xfrm>
+          <a:prstGeom prst="rect">
+            <a:avLst/>
+          </a:prstGeom>
+        </p:spPr>
+        <p:txBody>
+          <a:bodyPr wrap="square">
+            <a:spAutoFit/>
+          </a:bodyPr>
+          <a:lstStyle/>
+          <a:p>
+            <a:pPr>
+              <a:lnSpc>
+                <a:spcPct val="200000"/>
+              </a:lnSpc>
+            </a:pPr>
+            <a:r>
+              <a:rPr lang="en-US" sz="2000" b="1" dirty="0" smtClean="0">
+                <a:latin typeface="Arial" charset="0"/>
+                <a:ea typeface="Arial" charset="0"/>
+                <a:cs typeface="Arial" charset="0"/>
+              </a:rPr>
+              <a:t>Findings</a:t>
+            </a:r>
+            <a:endParaRPr lang="en-US" sz="1600" dirty="0" smtClean="0">
+              <a:latin typeface="Arial" charset="0"/>
+              <a:ea typeface="Arial" charset="0"/>
+              <a:cs typeface="Arial" charset="0"/>
+            </a:endParaRPr>
+          </a:p>
+          <a:p>
+            <a:pPr>
+              <a:lnSpc>
+                <a:spcPct val="200000"/>
+              </a:lnSpc>
+            </a:pPr>
+            <a:r>
+              <a:rPr lang="en-US" sz="1600" dirty="0" smtClean="0">
+                <a:latin typeface="Arial" charset="0"/>
+                <a:ea typeface="Arial" charset="0"/>
+                <a:cs typeface="Arial" charset="0"/>
+              </a:rPr>
+              <a:t>Here is delayed risk and risk prediction errors</a:t>
+            </a:r>
+          </a:p>
+          <a:p>
+            <a:pPr>
+              <a:lnSpc>
+                <a:spcPct val="200000"/>
+              </a:lnSpc>
+            </a:pPr>
+            <a:r>
+              <a:rPr lang="en-US" sz="1600" dirty="0" smtClean="0">
+                <a:latin typeface="Arial" charset="0"/>
+                <a:ea typeface="Arial" charset="0"/>
+                <a:cs typeface="Arial" charset="0"/>
+              </a:rPr>
+              <a:t>Expected risk/ risk prediction errors (expected risk 5 seconds after selection, risk prediction error during feedback)</a:t>
+            </a:r>
+          </a:p>
+          <a:p>
+            <a:pPr>
+              <a:lnSpc>
+                <a:spcPct val="200000"/>
+              </a:lnSpc>
+            </a:pPr>
+            <a:r>
+              <a:rPr lang="en-US" sz="1600" dirty="0">
+                <a:latin typeface="Arial" charset="0"/>
+                <a:ea typeface="Arial" charset="0"/>
+                <a:cs typeface="Arial" charset="0"/>
+              </a:rPr>
+              <a:t>	</a:t>
+            </a:r>
+            <a:r>
+              <a:rPr lang="en-US" sz="1600" dirty="0" smtClean="0">
+                <a:latin typeface="Arial" charset="0"/>
+                <a:ea typeface="Arial" charset="0"/>
+                <a:cs typeface="Arial" charset="0"/>
+              </a:rPr>
+              <a:t>Predator feedback</a:t>
+            </a:r>
+          </a:p>
+          <a:p>
+            <a:pPr>
+              <a:lnSpc>
+                <a:spcPct val="200000"/>
+              </a:lnSpc>
+            </a:pPr>
+            <a:r>
+              <a:rPr lang="en-US" sz="1600" dirty="0">
+                <a:latin typeface="Arial" charset="0"/>
+                <a:ea typeface="Arial" charset="0"/>
+                <a:cs typeface="Arial" charset="0"/>
+              </a:rPr>
+              <a:t>	</a:t>
+            </a:r>
+            <a:r>
+              <a:rPr lang="en-US" sz="1600" dirty="0" smtClean="0">
+                <a:latin typeface="Arial" charset="0"/>
+                <a:ea typeface="Arial" charset="0"/>
+                <a:cs typeface="Arial" charset="0"/>
+              </a:rPr>
+              <a:t>	Amygdala (negative): </a:t>
+            </a:r>
+            <a:r>
+              <a:rPr lang="en-US" sz="1600" i="1" dirty="0" smtClean="0">
+                <a:latin typeface="Arial" charset="0"/>
+                <a:ea typeface="Arial" charset="0"/>
+                <a:cs typeface="Arial" charset="0"/>
+              </a:rPr>
+              <a:t>p</a:t>
+            </a:r>
+            <a:r>
+              <a:rPr lang="en-US" sz="1600" dirty="0" smtClean="0">
+                <a:latin typeface="Arial" charset="0"/>
+                <a:ea typeface="Arial" charset="0"/>
+                <a:cs typeface="Arial" charset="0"/>
+              </a:rPr>
+              <a:t>=0.033</a:t>
+            </a:r>
+          </a:p>
+          <a:p>
+            <a:pPr>
+              <a:lnSpc>
+                <a:spcPct val="200000"/>
+              </a:lnSpc>
+            </a:pPr>
+            <a:r>
+              <a:rPr lang="en-US" sz="1600" dirty="0">
+                <a:latin typeface="Arial" charset="0"/>
+                <a:ea typeface="Arial" charset="0"/>
+                <a:cs typeface="Arial" charset="0"/>
+              </a:rPr>
+              <a:t>	</a:t>
+            </a:r>
+            <a:r>
+              <a:rPr lang="en-US" sz="1600" dirty="0" smtClean="0">
+                <a:latin typeface="Arial" charset="0"/>
+                <a:ea typeface="Arial" charset="0"/>
+                <a:cs typeface="Arial" charset="0"/>
+              </a:rPr>
+              <a:t>	Ventral Striatum (negative): </a:t>
+            </a:r>
+            <a:r>
+              <a:rPr lang="en-US" sz="1600" i="1" dirty="0" smtClean="0">
+                <a:latin typeface="Arial" charset="0"/>
+                <a:ea typeface="Arial" charset="0"/>
+                <a:cs typeface="Arial" charset="0"/>
+              </a:rPr>
+              <a:t>p</a:t>
+            </a:r>
+            <a:r>
+              <a:rPr lang="en-US" sz="1600" dirty="0" smtClean="0">
+                <a:latin typeface="Arial" charset="0"/>
+                <a:ea typeface="Arial" charset="0"/>
+                <a:cs typeface="Arial" charset="0"/>
+              </a:rPr>
+              <a:t>=0.028</a:t>
+            </a:r>
+          </a:p>
+          <a:p>
+            <a:pPr>
+              <a:lnSpc>
+                <a:spcPct val="200000"/>
+              </a:lnSpc>
+            </a:pPr>
+            <a:r>
+              <a:rPr lang="en-US" sz="1600" dirty="0">
+                <a:latin typeface="Arial" charset="0"/>
+                <a:ea typeface="Arial" charset="0"/>
+                <a:cs typeface="Arial" charset="0"/>
+              </a:rPr>
+              <a:t>	</a:t>
+            </a:r>
+            <a:r>
+              <a:rPr lang="en-US" sz="1600" dirty="0" smtClean="0">
+                <a:latin typeface="Arial" charset="0"/>
+                <a:ea typeface="Arial" charset="0"/>
+                <a:cs typeface="Arial" charset="0"/>
+              </a:rPr>
+              <a:t>Prey feedback</a:t>
+            </a:r>
+          </a:p>
+          <a:p>
+            <a:pPr>
+              <a:lnSpc>
+                <a:spcPct val="200000"/>
+              </a:lnSpc>
+            </a:pPr>
+            <a:r>
+              <a:rPr lang="en-US" sz="1600" dirty="0">
+                <a:latin typeface="Arial" charset="0"/>
+                <a:ea typeface="Arial" charset="0"/>
+                <a:cs typeface="Arial" charset="0"/>
+              </a:rPr>
+              <a:t>	</a:t>
+            </a:r>
+            <a:r>
+              <a:rPr lang="en-US" sz="1600" dirty="0" smtClean="0">
+                <a:latin typeface="Arial" charset="0"/>
+                <a:ea typeface="Arial" charset="0"/>
+                <a:cs typeface="Arial" charset="0"/>
+              </a:rPr>
+              <a:t>	Nothing</a:t>
+            </a:r>
+          </a:p>
+          <a:p>
+            <a:pPr>
+              <a:lnSpc>
+                <a:spcPct val="200000"/>
+              </a:lnSpc>
+            </a:pPr>
+            <a:r>
+              <a:rPr lang="en-US" sz="1600" dirty="0">
+                <a:latin typeface="Arial" charset="0"/>
+                <a:ea typeface="Arial" charset="0"/>
+                <a:cs typeface="Arial" charset="0"/>
+              </a:rPr>
+              <a:t>	</a:t>
+            </a:r>
+            <a:r>
+              <a:rPr lang="en-US" sz="1600" dirty="0" smtClean="0">
+                <a:latin typeface="Arial" charset="0"/>
+                <a:ea typeface="Arial" charset="0"/>
+                <a:cs typeface="Arial" charset="0"/>
+              </a:rPr>
+              <a:t>Predator selection</a:t>
+            </a:r>
+          </a:p>
+          <a:p>
+            <a:pPr>
+              <a:lnSpc>
+                <a:spcPct val="200000"/>
+              </a:lnSpc>
+            </a:pPr>
+            <a:r>
+              <a:rPr lang="en-US" sz="1600" dirty="0">
+                <a:latin typeface="Arial" charset="0"/>
+                <a:ea typeface="Arial" charset="0"/>
+                <a:cs typeface="Arial" charset="0"/>
+              </a:rPr>
+              <a:t>	</a:t>
+            </a:r>
+            <a:r>
+              <a:rPr lang="en-US" sz="1600" dirty="0" smtClean="0">
+                <a:latin typeface="Arial" charset="0"/>
+                <a:ea typeface="Arial" charset="0"/>
+                <a:cs typeface="Arial" charset="0"/>
+              </a:rPr>
+              <a:t>	</a:t>
+            </a:r>
+            <a:r>
+              <a:rPr lang="en-US" sz="1600" dirty="0">
+                <a:latin typeface="Arial" charset="0"/>
+                <a:ea typeface="Arial" charset="0"/>
+                <a:cs typeface="Arial" charset="0"/>
+              </a:rPr>
+              <a:t>Amygdala </a:t>
+            </a:r>
+            <a:r>
+              <a:rPr lang="en-US" sz="1600" dirty="0" smtClean="0">
+                <a:latin typeface="Arial" charset="0"/>
+                <a:ea typeface="Arial" charset="0"/>
+                <a:cs typeface="Arial" charset="0"/>
+              </a:rPr>
+              <a:t>(positive): </a:t>
+            </a:r>
+            <a:r>
+              <a:rPr lang="en-US" sz="1600" i="1" dirty="0" smtClean="0">
+                <a:latin typeface="Arial" charset="0"/>
+                <a:ea typeface="Arial" charset="0"/>
+                <a:cs typeface="Arial" charset="0"/>
+              </a:rPr>
+              <a:t>p</a:t>
+            </a:r>
+            <a:r>
+              <a:rPr lang="en-US" sz="1600" dirty="0" smtClean="0">
+                <a:latin typeface="Arial" charset="0"/>
+                <a:ea typeface="Arial" charset="0"/>
+                <a:cs typeface="Arial" charset="0"/>
+              </a:rPr>
+              <a:t>=0.0608</a:t>
+            </a:r>
+          </a:p>
+          <a:p>
+            <a:pPr>
+              <a:lnSpc>
+                <a:spcPct val="200000"/>
+              </a:lnSpc>
+            </a:pPr>
+            <a:r>
+              <a:rPr lang="en-US" sz="1600" dirty="0">
+                <a:latin typeface="Arial" charset="0"/>
+                <a:ea typeface="Arial" charset="0"/>
+                <a:cs typeface="Arial" charset="0"/>
+              </a:rPr>
+              <a:t>	</a:t>
+            </a:r>
+            <a:r>
+              <a:rPr lang="en-US" sz="1600" dirty="0" smtClean="0">
+                <a:latin typeface="Arial" charset="0"/>
+                <a:ea typeface="Arial" charset="0"/>
+                <a:cs typeface="Arial" charset="0"/>
+              </a:rPr>
+              <a:t>	Anterior Insula </a:t>
+            </a:r>
+            <a:r>
+              <a:rPr lang="en-US" sz="1600" dirty="0">
+                <a:latin typeface="Arial" charset="0"/>
+                <a:ea typeface="Arial" charset="0"/>
+                <a:cs typeface="Arial" charset="0"/>
+              </a:rPr>
+              <a:t>(positive): </a:t>
+            </a:r>
+            <a:r>
+              <a:rPr lang="en-US" sz="1600" i="1" dirty="0" smtClean="0">
+                <a:latin typeface="Arial" charset="0"/>
+                <a:ea typeface="Arial" charset="0"/>
+                <a:cs typeface="Arial" charset="0"/>
+              </a:rPr>
+              <a:t>p</a:t>
+            </a:r>
+            <a:r>
+              <a:rPr lang="en-US" sz="1600" dirty="0" smtClean="0">
+                <a:latin typeface="Arial" charset="0"/>
+                <a:ea typeface="Arial" charset="0"/>
+                <a:cs typeface="Arial" charset="0"/>
+              </a:rPr>
+              <a:t>=0.0214</a:t>
+            </a:r>
+          </a:p>
+          <a:p>
+            <a:pPr>
+              <a:lnSpc>
+                <a:spcPct val="200000"/>
+              </a:lnSpc>
+            </a:pPr>
+            <a:r>
+              <a:rPr lang="en-US" sz="1600" dirty="0" smtClean="0">
+                <a:latin typeface="Arial" charset="0"/>
+                <a:ea typeface="Arial" charset="0"/>
+                <a:cs typeface="Arial" charset="0"/>
+              </a:rPr>
+              <a:t>		DLPFC </a:t>
+            </a:r>
+            <a:r>
+              <a:rPr lang="en-US" sz="1600" dirty="0">
+                <a:latin typeface="Arial" charset="0"/>
+                <a:ea typeface="Arial" charset="0"/>
+                <a:cs typeface="Arial" charset="0"/>
+              </a:rPr>
+              <a:t>(positive): </a:t>
+            </a:r>
+            <a:r>
+              <a:rPr lang="en-US" sz="1600" i="1" dirty="0" smtClean="0">
+                <a:latin typeface="Arial" charset="0"/>
+                <a:ea typeface="Arial" charset="0"/>
+                <a:cs typeface="Arial" charset="0"/>
+              </a:rPr>
+              <a:t>p</a:t>
+            </a:r>
+            <a:r>
+              <a:rPr lang="en-US" sz="1600" dirty="0" smtClean="0">
+                <a:latin typeface="Arial" charset="0"/>
+                <a:ea typeface="Arial" charset="0"/>
+                <a:cs typeface="Arial" charset="0"/>
+              </a:rPr>
+              <a:t>=0.0254</a:t>
+            </a:r>
+          </a:p>
+          <a:p>
+            <a:pPr>
+              <a:lnSpc>
+                <a:spcPct val="200000"/>
+              </a:lnSpc>
+            </a:pPr>
+            <a:r>
+              <a:rPr lang="en-US" sz="1600" dirty="0">
+                <a:latin typeface="Arial" charset="0"/>
+                <a:ea typeface="Arial" charset="0"/>
+                <a:cs typeface="Arial" charset="0"/>
+              </a:rPr>
+              <a:t>	</a:t>
+            </a:r>
+            <a:r>
+              <a:rPr lang="en-US" sz="1600" dirty="0" smtClean="0">
+                <a:latin typeface="Arial" charset="0"/>
+                <a:ea typeface="Arial" charset="0"/>
+                <a:cs typeface="Arial" charset="0"/>
+              </a:rPr>
+              <a:t>	VMPFC </a:t>
+            </a:r>
+            <a:r>
+              <a:rPr lang="en-US" sz="1600" dirty="0">
+                <a:latin typeface="Arial" charset="0"/>
+                <a:ea typeface="Arial" charset="0"/>
+                <a:cs typeface="Arial" charset="0"/>
+              </a:rPr>
+              <a:t>(positive): </a:t>
+            </a:r>
+            <a:r>
+              <a:rPr lang="en-US" sz="1600" i="1" dirty="0" smtClean="0">
+                <a:latin typeface="Arial" charset="0"/>
+                <a:ea typeface="Arial" charset="0"/>
+                <a:cs typeface="Arial" charset="0"/>
+              </a:rPr>
+              <a:t>p</a:t>
+            </a:r>
+            <a:r>
+              <a:rPr lang="en-US" sz="1600" dirty="0" smtClean="0">
+                <a:latin typeface="Arial" charset="0"/>
+                <a:ea typeface="Arial" charset="0"/>
+                <a:cs typeface="Arial" charset="0"/>
+              </a:rPr>
+              <a:t>=0.0254</a:t>
+            </a:r>
+          </a:p>
+          <a:p>
+            <a:pPr>
+              <a:lnSpc>
+                <a:spcPct val="200000"/>
+              </a:lnSpc>
+            </a:pPr>
+            <a:r>
+              <a:rPr lang="en-US" sz="1600" dirty="0">
+                <a:latin typeface="Arial" charset="0"/>
+                <a:ea typeface="Arial" charset="0"/>
+                <a:cs typeface="Arial" charset="0"/>
+              </a:rPr>
+              <a:t>	</a:t>
+            </a:r>
+            <a:r>
+              <a:rPr lang="en-US" sz="1600" dirty="0" smtClean="0">
+                <a:latin typeface="Arial" charset="0"/>
+                <a:ea typeface="Arial" charset="0"/>
+                <a:cs typeface="Arial" charset="0"/>
+              </a:rPr>
+              <a:t>	Whole brain (positive): lots </a:t>
+            </a:r>
+            <a:r>
+              <a:rPr lang="en-US" sz="1600" smtClean="0">
+                <a:latin typeface="Arial" charset="0"/>
+                <a:ea typeface="Arial" charset="0"/>
+                <a:cs typeface="Arial" charset="0"/>
+              </a:rPr>
+              <a:t>of places, </a:t>
+            </a:r>
+            <a:r>
+              <a:rPr lang="en-US" sz="1600" i="1" smtClean="0">
+                <a:latin typeface="Arial" charset="0"/>
+                <a:ea typeface="Arial" charset="0"/>
+                <a:cs typeface="Arial" charset="0"/>
+              </a:rPr>
+              <a:t>p</a:t>
+            </a:r>
+            <a:r>
+              <a:rPr lang="en-US" sz="1600" smtClean="0">
+                <a:latin typeface="Arial" charset="0"/>
+                <a:ea typeface="Arial" charset="0"/>
+                <a:cs typeface="Arial" charset="0"/>
+              </a:rPr>
+              <a:t>,0.025: </a:t>
+            </a:r>
+            <a:r>
+              <a:rPr lang="en-US" sz="1600" dirty="0" smtClean="0">
+                <a:latin typeface="Arial" charset="0"/>
+                <a:ea typeface="Arial" charset="0"/>
+                <a:cs typeface="Arial" charset="0"/>
+              </a:rPr>
+              <a:t>IFG</a:t>
+            </a:r>
+            <a:r>
+              <a:rPr lang="en-US" sz="1600" smtClean="0">
+                <a:latin typeface="Arial" charset="0"/>
+                <a:ea typeface="Arial" charset="0"/>
+                <a:cs typeface="Arial" charset="0"/>
+              </a:rPr>
+              <a:t>, thalamus, TPJ, </a:t>
+            </a:r>
+            <a:endParaRPr lang="en-US" sz="1600" dirty="0">
+              <a:latin typeface="Arial" charset="0"/>
+              <a:ea typeface="Arial" charset="0"/>
+              <a:cs typeface="Arial" charset="0"/>
+            </a:endParaRPr>
+          </a:p>
+          <a:p>
+            <a:pPr>
+              <a:lnSpc>
+                <a:spcPct val="200000"/>
+              </a:lnSpc>
+            </a:pPr>
+            <a:endParaRPr lang="en-US" sz="1600" dirty="0">
+              <a:latin typeface="Arial" charset="0"/>
+              <a:ea typeface="Arial" charset="0"/>
+              <a:cs typeface="Arial" charset="0"/>
+            </a:endParaRPr>
+          </a:p>
+        </p:txBody>
+      </p:sp>
+    </p:spTree>
+    <p:extLst>
+      <p:ext uri="{BB962C8B-B14F-4D97-AF65-F5344CB8AC3E}">
+        <p14:creationId xmlns:p14="http://schemas.microsoft.com/office/powerpoint/2010/main" val="723139091"/>
+      </p:ext>
+    </p:extLst>
+  </p:cSld>
+  <p:clrMapOvr>
+    <a:masterClrMapping/>
+  </p:clrMapOvr>
+  <p:timing>
+    <p:tnLst>
+      <p:par>
+        <p:cTn id="1" dur="indefinite" restart="never" nodeType="tmRoot"/>
+      </p:par>
+    </p:tnLst>
+  </p:timing>
+</p:sld>
+</file>
+
+<file path=ppt/slides/slide22.xml><?xml version="1.0" encoding="utf-8"?>
+<p:sld xmlns:a="http://schemas.openxmlformats.org/drawingml/2006/main" xmlns:r="http://schemas.openxmlformats.org/officeDocument/2006/relationships" xmlns:p="http://schemas.openxmlformats.org/presentationml/2006/main">
+  <p:cSld>
+    <p:spTree>
+      <p:nvGrpSpPr>
+        <p:cNvPr id="1" name=""/>
+        <p:cNvGrpSpPr/>
+        <p:nvPr/>
+      </p:nvGrpSpPr>
+      <p:grpSpPr>
+        <a:xfrm>
+          <a:off x="0" y="0"/>
+          <a:ext cx="0" cy="0"/>
+          <a:chOff x="0" y="0"/>
+          <a:chExt cx="0" cy="0"/>
+        </a:xfrm>
+      </p:grpSpPr>
+      <p:sp>
+        <p:nvSpPr>
+          <p:cNvPr id="4" name="Rectangle 3"/>
+          <p:cNvSpPr/>
+          <p:nvPr/>
+        </p:nvSpPr>
+        <p:spPr>
+          <a:xfrm>
+            <a:off x="0" y="-158222"/>
+            <a:ext cx="11756571" cy="4154984"/>
+          </a:xfrm>
+          <a:prstGeom prst="rect">
+            <a:avLst/>
+          </a:prstGeom>
+        </p:spPr>
+        <p:txBody>
+          <a:bodyPr wrap="square">
+            <a:spAutoFit/>
+          </a:bodyPr>
+          <a:lstStyle/>
+          <a:p>
+            <a:pPr>
+              <a:lnSpc>
+                <a:spcPct val="200000"/>
+              </a:lnSpc>
+            </a:pPr>
+            <a:r>
+              <a:rPr lang="en-US" sz="2000" b="1" dirty="0" smtClean="0">
+                <a:latin typeface="Arial" charset="0"/>
+                <a:ea typeface="Arial" charset="0"/>
+                <a:cs typeface="Arial" charset="0"/>
+              </a:rPr>
+              <a:t>Findings</a:t>
+            </a:r>
+            <a:endParaRPr lang="en-US" sz="1600" dirty="0" smtClean="0">
+              <a:latin typeface="Arial" charset="0"/>
+              <a:ea typeface="Arial" charset="0"/>
+              <a:cs typeface="Arial" charset="0"/>
+            </a:endParaRPr>
+          </a:p>
+          <a:p>
+            <a:pPr>
+              <a:lnSpc>
+                <a:spcPct val="200000"/>
+              </a:lnSpc>
+            </a:pPr>
+            <a:r>
+              <a:rPr lang="en-US" sz="1600" dirty="0" smtClean="0">
+                <a:latin typeface="Arial" charset="0"/>
+                <a:ea typeface="Arial" charset="0"/>
+                <a:cs typeface="Arial" charset="0"/>
+              </a:rPr>
+              <a:t>Here is delayed risk and risk prediction errors</a:t>
+            </a:r>
+          </a:p>
+          <a:p>
+            <a:pPr>
+              <a:lnSpc>
+                <a:spcPct val="200000"/>
+              </a:lnSpc>
+            </a:pPr>
+            <a:r>
+              <a:rPr lang="en-US" sz="1600" dirty="0" smtClean="0">
+                <a:latin typeface="Arial" charset="0"/>
+                <a:ea typeface="Arial" charset="0"/>
+                <a:cs typeface="Arial" charset="0"/>
+              </a:rPr>
+              <a:t>Expected risk/ risk prediction errors (expected risk 5 seconds after selection, risk prediction error during feedback)</a:t>
+            </a:r>
+          </a:p>
+          <a:p>
+            <a:pPr>
+              <a:lnSpc>
+                <a:spcPct val="200000"/>
+              </a:lnSpc>
+            </a:pPr>
+            <a:r>
+              <a:rPr lang="en-US" sz="1600" dirty="0">
+                <a:latin typeface="Arial" charset="0"/>
+                <a:ea typeface="Arial" charset="0"/>
+                <a:cs typeface="Arial" charset="0"/>
+              </a:rPr>
+              <a:t>	</a:t>
+            </a:r>
+            <a:endParaRPr lang="en-US" sz="1600" dirty="0">
+              <a:latin typeface="Arial" charset="0"/>
+              <a:ea typeface="Arial" charset="0"/>
+              <a:cs typeface="Arial" charset="0"/>
+            </a:endParaRPr>
+          </a:p>
+          <a:p>
+            <a:pPr>
+              <a:lnSpc>
+                <a:spcPct val="200000"/>
+              </a:lnSpc>
+            </a:pPr>
+            <a:r>
+              <a:rPr lang="en-US" sz="1600" dirty="0">
+                <a:latin typeface="Arial" charset="0"/>
+                <a:ea typeface="Arial" charset="0"/>
+                <a:cs typeface="Arial" charset="0"/>
+              </a:rPr>
+              <a:t>	</a:t>
+            </a:r>
+            <a:r>
+              <a:rPr lang="en-US" sz="1600" dirty="0" smtClean="0">
+                <a:latin typeface="Arial" charset="0"/>
+                <a:ea typeface="Arial" charset="0"/>
+                <a:cs typeface="Arial" charset="0"/>
+              </a:rPr>
+              <a:t>Prey selection</a:t>
+            </a:r>
+          </a:p>
+          <a:p>
+            <a:pPr>
+              <a:lnSpc>
+                <a:spcPct val="200000"/>
+              </a:lnSpc>
+            </a:pPr>
+            <a:r>
+              <a:rPr lang="en-US" sz="1600" dirty="0">
+                <a:latin typeface="Arial" charset="0"/>
+                <a:ea typeface="Arial" charset="0"/>
+                <a:cs typeface="Arial" charset="0"/>
+              </a:rPr>
+              <a:t>	</a:t>
+            </a:r>
+            <a:r>
+              <a:rPr lang="en-US" sz="1600" dirty="0" smtClean="0">
+                <a:latin typeface="Arial" charset="0"/>
+                <a:ea typeface="Arial" charset="0"/>
+                <a:cs typeface="Arial" charset="0"/>
+              </a:rPr>
+              <a:t>	Amygdala (positive): </a:t>
+            </a:r>
+            <a:r>
+              <a:rPr lang="en-US" sz="1600" i="1" dirty="0" smtClean="0">
+                <a:latin typeface="Arial" charset="0"/>
+                <a:ea typeface="Arial" charset="0"/>
+                <a:cs typeface="Arial" charset="0"/>
+              </a:rPr>
+              <a:t>p</a:t>
+            </a:r>
+            <a:r>
+              <a:rPr lang="en-US" sz="1600" dirty="0" smtClean="0">
+                <a:latin typeface="Arial" charset="0"/>
+                <a:ea typeface="Arial" charset="0"/>
+                <a:cs typeface="Arial" charset="0"/>
+              </a:rPr>
+              <a:t>=0.069</a:t>
+            </a:r>
+          </a:p>
+          <a:p>
+            <a:pPr>
+              <a:lnSpc>
+                <a:spcPct val="200000"/>
+              </a:lnSpc>
+            </a:pPr>
+            <a:r>
+              <a:rPr lang="en-US" sz="1600" dirty="0">
+                <a:latin typeface="Arial" charset="0"/>
+                <a:ea typeface="Arial" charset="0"/>
+                <a:cs typeface="Arial" charset="0"/>
+              </a:rPr>
+              <a:t>	</a:t>
+            </a:r>
+            <a:r>
+              <a:rPr lang="en-US" sz="1600" dirty="0" smtClean="0">
+                <a:latin typeface="Arial" charset="0"/>
+                <a:ea typeface="Arial" charset="0"/>
+                <a:cs typeface="Arial" charset="0"/>
+              </a:rPr>
+              <a:t>	DLPFC (positive): </a:t>
+            </a:r>
+            <a:r>
+              <a:rPr lang="en-US" sz="1600" i="1" dirty="0" smtClean="0">
+                <a:latin typeface="Arial" charset="0"/>
+                <a:ea typeface="Arial" charset="0"/>
+                <a:cs typeface="Arial" charset="0"/>
+              </a:rPr>
+              <a:t>p</a:t>
+            </a:r>
+            <a:r>
+              <a:rPr lang="en-US" sz="1600" dirty="0" smtClean="0">
+                <a:latin typeface="Arial" charset="0"/>
+                <a:ea typeface="Arial" charset="0"/>
+                <a:cs typeface="Arial" charset="0"/>
+              </a:rPr>
+              <a:t>=0.0302</a:t>
+            </a:r>
+          </a:p>
+          <a:p>
+            <a:pPr>
+              <a:lnSpc>
+                <a:spcPct val="200000"/>
+              </a:lnSpc>
+            </a:pPr>
+            <a:r>
+              <a:rPr lang="en-US" sz="1600" dirty="0">
+                <a:latin typeface="Arial" charset="0"/>
+                <a:ea typeface="Arial" charset="0"/>
+                <a:cs typeface="Arial" charset="0"/>
+              </a:rPr>
+              <a:t>	</a:t>
+            </a:r>
+            <a:endParaRPr lang="en-US" sz="1600" dirty="0" smtClean="0">
+              <a:latin typeface="Arial" charset="0"/>
+              <a:ea typeface="Arial" charset="0"/>
+              <a:cs typeface="Arial" charset="0"/>
+            </a:endParaRPr>
+          </a:p>
+        </p:txBody>
+      </p:sp>
+    </p:spTree>
+    <p:extLst>
+      <p:ext uri="{BB962C8B-B14F-4D97-AF65-F5344CB8AC3E}">
+        <p14:creationId xmlns:p14="http://schemas.microsoft.com/office/powerpoint/2010/main" val="305242899"/>
+      </p:ext>
+    </p:extLst>
+  </p:cSld>
+  <p:clrMapOvr>
+    <a:masterClrMapping/>
+  </p:clrMapOvr>
+  <p:timing>
+    <p:tnLst>
+      <p:par>
+        <p:cTn id="1" dur="indefinite" restart="never" nodeType="tmRoot"/>
+      </p:par>
+    </p:tnLst>
+  </p:timing>
+</p:sld>
+</file>
+
+<file path=ppt/slides/slide23.xml><?xml version="1.0" encoding="utf-8"?>
 <p:sld xmlns:a="http://schemas.openxmlformats.org/drawingml/2006/main" xmlns:r="http://schemas.openxmlformats.org/officeDocument/2006/relationships" xmlns:p="http://schemas.openxmlformats.org/presentationml/2006/main">
   <p:cSld>
     <p:spTree>
@@ -8500,7 +9678,7 @@
 </p:sld>
 </file>
 
-<file path=ppt/slides/slide21.xml><?xml version="1.0" encoding="utf-8"?>
+<file path=ppt/slides/slide24.xml><?xml version="1.0" encoding="utf-8"?>
 <p:sld xmlns:a="http://schemas.openxmlformats.org/drawingml/2006/main" xmlns:r="http://schemas.openxmlformats.org/officeDocument/2006/relationships" xmlns:p="http://schemas.openxmlformats.org/presentationml/2006/main">
   <p:cSld>
     <p:spTree>
@@ -8959,7 +10137,7 @@
 </p:sld>
 </file>
 
-<file path=ppt/slides/slide22.xml><?xml version="1.0" encoding="utf-8"?>
+<file path=ppt/slides/slide25.xml><?xml version="1.0" encoding="utf-8"?>
 <p:sld xmlns:a="http://schemas.openxmlformats.org/drawingml/2006/main" xmlns:r="http://schemas.openxmlformats.org/officeDocument/2006/relationships" xmlns:p="http://schemas.openxmlformats.org/presentationml/2006/main">
   <p:cSld>
     <p:spTree>
@@ -9346,7 +10524,7 @@
 </p:sld>
 </file>
 
-<file path=ppt/slides/slide23.xml><?xml version="1.0" encoding="utf-8"?>
+<file path=ppt/slides/slide26.xml><?xml version="1.0" encoding="utf-8"?>
 <p:sld xmlns:a="http://schemas.openxmlformats.org/drawingml/2006/main" xmlns:r="http://schemas.openxmlformats.org/officeDocument/2006/relationships" xmlns:p="http://schemas.openxmlformats.org/presentationml/2006/main">
   <p:cSld>
     <p:spTree>
@@ -9663,7 +10841,7 @@
 </p:sld>
 </file>
 
-<file path=ppt/slides/slide24.xml><?xml version="1.0" encoding="utf-8"?>
+<file path=ppt/slides/slide27.xml><?xml version="1.0" encoding="utf-8"?>
 <p:sld xmlns:a="http://schemas.openxmlformats.org/drawingml/2006/main" xmlns:r="http://schemas.openxmlformats.org/officeDocument/2006/relationships" xmlns:p="http://schemas.openxmlformats.org/presentationml/2006/main">
   <p:cSld>
     <p:spTree>
@@ -9972,7 +11150,7 @@
 </p:sld>
 </file>
 
-<file path=ppt/slides/slide25.xml><?xml version="1.0" encoding="utf-8"?>
+<file path=ppt/slides/slide28.xml><?xml version="1.0" encoding="utf-8"?>
 <p:sld xmlns:a="http://schemas.openxmlformats.org/drawingml/2006/main" xmlns:r="http://schemas.openxmlformats.org/officeDocument/2006/relationships" xmlns:p="http://schemas.openxmlformats.org/presentationml/2006/main">
   <p:cSld>
     <p:spTree>
@@ -10306,7 +11484,7 @@
 </p:sld>
 </file>
 
-<file path=ppt/slides/slide26.xml><?xml version="1.0" encoding="utf-8"?>
+<file path=ppt/slides/slide29.xml><?xml version="1.0" encoding="utf-8"?>
 <p:sld xmlns:a="http://schemas.openxmlformats.org/drawingml/2006/main" xmlns:r="http://schemas.openxmlformats.org/officeDocument/2006/relationships" xmlns:p="http://schemas.openxmlformats.org/presentationml/2006/main">
   <p:cSld>
     <p:spTree>
@@ -10759,7 +11937,505 @@
 </p:sld>
 </file>
 
-<file path=ppt/slides/slide27.xml><?xml version="1.0" encoding="utf-8"?>
+<file path=ppt/slides/slide3.xml><?xml version="1.0" encoding="utf-8"?>
+<p:sld xmlns:a="http://schemas.openxmlformats.org/drawingml/2006/main" xmlns:r="http://schemas.openxmlformats.org/officeDocument/2006/relationships" xmlns:p="http://schemas.openxmlformats.org/presentationml/2006/main">
+  <p:cSld>
+    <p:spTree>
+      <p:nvGrpSpPr>
+        <p:cNvPr id="1" name=""/>
+        <p:cNvGrpSpPr/>
+        <p:nvPr/>
+      </p:nvGrpSpPr>
+      <p:grpSpPr>
+        <a:xfrm>
+          <a:off x="0" y="0"/>
+          <a:ext cx="0" cy="0"/>
+          <a:chOff x="0" y="0"/>
+          <a:chExt cx="0" cy="0"/>
+        </a:xfrm>
+      </p:grpSpPr>
+      <p:sp>
+        <p:nvSpPr>
+          <p:cNvPr id="2" name="TextBox 1"/>
+          <p:cNvSpPr txBox="1"/>
+          <p:nvPr/>
+        </p:nvSpPr>
+        <p:spPr>
+          <a:xfrm>
+            <a:off x="4698124" y="609600"/>
+            <a:ext cx="2481449" cy="369332"/>
+          </a:xfrm>
+          <a:prstGeom prst="rect">
+            <a:avLst/>
+          </a:prstGeom>
+          <a:noFill/>
+        </p:spPr>
+        <p:txBody>
+          <a:bodyPr wrap="none" rtlCol="0">
+            <a:spAutoFit/>
+          </a:bodyPr>
+          <a:lstStyle/>
+          <a:p>
+            <a:r>
+              <a:rPr lang="en-US" dirty="0" smtClean="0"/>
+              <a:t>The Predator Prey Game</a:t>
+            </a:r>
+            <a:endParaRPr lang="en-US" dirty="0"/>
+          </a:p>
+        </p:txBody>
+      </p:sp>
+      <p:sp>
+        <p:nvSpPr>
+          <p:cNvPr id="5" name="TextBox 4"/>
+          <p:cNvSpPr txBox="1"/>
+          <p:nvPr/>
+        </p:nvSpPr>
+        <p:spPr>
+          <a:xfrm>
+            <a:off x="529021" y="1091906"/>
+            <a:ext cx="7721599" cy="2308324"/>
+          </a:xfrm>
+          <a:prstGeom prst="rect">
+            <a:avLst/>
+          </a:prstGeom>
+          <a:noFill/>
+        </p:spPr>
+        <p:txBody>
+          <a:bodyPr wrap="square" rtlCol="0">
+            <a:spAutoFit/>
+          </a:bodyPr>
+          <a:lstStyle/>
+          <a:p>
+            <a:r>
+              <a:rPr lang="en-US" dirty="0" smtClean="0"/>
+              <a:t>Two-player, one-shot design</a:t>
+            </a:r>
+          </a:p>
+          <a:p>
+            <a:r>
+              <a:rPr lang="en-US" dirty="0" smtClean="0"/>
+              <a:t>Rules</a:t>
+            </a:r>
+            <a:endParaRPr lang="en-US" dirty="0"/>
+          </a:p>
+          <a:p>
+            <a:pPr marL="285750" indent="-285750">
+              <a:buFont typeface="Arial" charset="0"/>
+              <a:buChar char="•"/>
+            </a:pPr>
+            <a:r>
+              <a:rPr lang="en-US" dirty="0"/>
+              <a:t>Each player starts with €</a:t>
+            </a:r>
+            <a:r>
+              <a:rPr lang="en-US" dirty="0" smtClean="0"/>
+              <a:t>10</a:t>
+            </a:r>
+            <a:endParaRPr lang="en-US" dirty="0"/>
+          </a:p>
+          <a:p>
+            <a:pPr marL="285750" indent="-285750">
+              <a:buFont typeface="Arial" charset="0"/>
+              <a:buChar char="•"/>
+            </a:pPr>
+            <a:r>
+              <a:rPr lang="en-US" dirty="0"/>
+              <a:t>If the prey invests as much or more than the predator, both keep their remaining </a:t>
+            </a:r>
+            <a:r>
+              <a:rPr lang="en-US" dirty="0" smtClean="0"/>
+              <a:t>endowment</a:t>
+            </a:r>
+            <a:endParaRPr lang="en-US" dirty="0"/>
+          </a:p>
+          <a:p>
+            <a:pPr marL="285750" indent="-285750">
+              <a:buFont typeface="Arial" charset="0"/>
+              <a:buChar char="•"/>
+            </a:pPr>
+            <a:r>
+              <a:rPr lang="en-US" dirty="0"/>
+              <a:t>If the predator invests more than the prey, predator adds preys remainder to his own remainder.</a:t>
+            </a:r>
+          </a:p>
+          <a:p>
+            <a:endParaRPr lang="en-US" dirty="0"/>
+          </a:p>
+        </p:txBody>
+      </p:sp>
+      <p:sp>
+        <p:nvSpPr>
+          <p:cNvPr id="6" name="TextBox 5"/>
+          <p:cNvSpPr txBox="1"/>
+          <p:nvPr/>
+        </p:nvSpPr>
+        <p:spPr>
+          <a:xfrm>
+            <a:off x="1319549" y="3752310"/>
+            <a:ext cx="1894832" cy="2862323"/>
+          </a:xfrm>
+          <a:prstGeom prst="rect">
+            <a:avLst/>
+          </a:prstGeom>
+          <a:noFill/>
+          <a:ln>
+            <a:solidFill>
+              <a:srgbClr val="000000"/>
+            </a:solidFill>
+          </a:ln>
+        </p:spPr>
+        <p:txBody>
+          <a:bodyPr wrap="none" rtlCol="0">
+            <a:spAutoFit/>
+          </a:bodyPr>
+          <a:lstStyle/>
+          <a:p>
+            <a:r>
+              <a:rPr lang="en-US" b="1" dirty="0"/>
+              <a:t>Predator</a:t>
+            </a:r>
+          </a:p>
+          <a:p>
+            <a:endParaRPr lang="en-US" dirty="0"/>
+          </a:p>
+          <a:p>
+            <a:r>
+              <a:rPr lang="en-US" dirty="0"/>
+              <a:t>Endowment = €10</a:t>
+            </a:r>
+          </a:p>
+          <a:p>
+            <a:endParaRPr lang="en-US" dirty="0"/>
+          </a:p>
+          <a:p>
+            <a:endParaRPr lang="en-US" dirty="0"/>
+          </a:p>
+          <a:p>
+            <a:r>
+              <a:rPr lang="en-US" dirty="0"/>
+              <a:t>Investment = €3</a:t>
+            </a:r>
+          </a:p>
+          <a:p>
+            <a:endParaRPr lang="en-US" dirty="0"/>
+          </a:p>
+          <a:p>
+            <a:endParaRPr lang="en-US" dirty="0"/>
+          </a:p>
+          <a:p>
+            <a:r>
+              <a:rPr lang="en-US" u="sng" dirty="0"/>
+              <a:t>Payout </a:t>
+            </a:r>
+          </a:p>
+          <a:p>
+            <a:r>
+              <a:rPr lang="en-US" dirty="0"/>
+              <a:t>10-3 = €7</a:t>
+            </a:r>
+          </a:p>
+        </p:txBody>
+      </p:sp>
+      <p:sp>
+        <p:nvSpPr>
+          <p:cNvPr id="7" name="TextBox 6"/>
+          <p:cNvSpPr txBox="1"/>
+          <p:nvPr/>
+        </p:nvSpPr>
+        <p:spPr>
+          <a:xfrm>
+            <a:off x="3671023" y="3752310"/>
+            <a:ext cx="1894832" cy="2862323"/>
+          </a:xfrm>
+          <a:prstGeom prst="rect">
+            <a:avLst/>
+          </a:prstGeom>
+          <a:noFill/>
+          <a:ln>
+            <a:solidFill>
+              <a:srgbClr val="000000"/>
+            </a:solidFill>
+          </a:ln>
+        </p:spPr>
+        <p:txBody>
+          <a:bodyPr wrap="none" rtlCol="0">
+            <a:spAutoFit/>
+          </a:bodyPr>
+          <a:lstStyle/>
+          <a:p>
+            <a:r>
+              <a:rPr lang="en-US" b="1" dirty="0"/>
+              <a:t>Prey</a:t>
+            </a:r>
+          </a:p>
+          <a:p>
+            <a:endParaRPr lang="en-US" dirty="0"/>
+          </a:p>
+          <a:p>
+            <a:r>
+              <a:rPr lang="en-US" dirty="0"/>
+              <a:t>Endowment = €10</a:t>
+            </a:r>
+          </a:p>
+          <a:p>
+            <a:endParaRPr lang="en-US" dirty="0"/>
+          </a:p>
+          <a:p>
+            <a:endParaRPr lang="en-US" dirty="0"/>
+          </a:p>
+          <a:p>
+            <a:r>
+              <a:rPr lang="en-US" dirty="0"/>
+              <a:t>Investment = €4</a:t>
+            </a:r>
+          </a:p>
+          <a:p>
+            <a:endParaRPr lang="en-US" dirty="0"/>
+          </a:p>
+          <a:p>
+            <a:endParaRPr lang="en-US" dirty="0"/>
+          </a:p>
+          <a:p>
+            <a:r>
+              <a:rPr lang="en-US" u="sng" dirty="0"/>
+              <a:t>Payout </a:t>
+            </a:r>
+          </a:p>
+          <a:p>
+            <a:r>
+              <a:rPr lang="en-US" dirty="0"/>
+              <a:t>10-4 = €6</a:t>
+            </a:r>
+          </a:p>
+        </p:txBody>
+      </p:sp>
+      <p:sp>
+        <p:nvSpPr>
+          <p:cNvPr id="3" name="TextBox 2"/>
+          <p:cNvSpPr txBox="1"/>
+          <p:nvPr/>
+        </p:nvSpPr>
+        <p:spPr>
+          <a:xfrm>
+            <a:off x="2861206" y="3382978"/>
+            <a:ext cx="1409745" cy="369332"/>
+          </a:xfrm>
+          <a:prstGeom prst="rect">
+            <a:avLst/>
+          </a:prstGeom>
+          <a:noFill/>
+        </p:spPr>
+        <p:txBody>
+          <a:bodyPr wrap="none" rtlCol="0">
+            <a:spAutoFit/>
+          </a:bodyPr>
+          <a:lstStyle/>
+          <a:p>
+            <a:r>
+              <a:rPr lang="en-US" dirty="0" smtClean="0"/>
+              <a:t>Prey survives</a:t>
+            </a:r>
+            <a:endParaRPr lang="en-US" dirty="0"/>
+          </a:p>
+        </p:txBody>
+      </p:sp>
+      <p:sp>
+        <p:nvSpPr>
+          <p:cNvPr id="8" name="TextBox 7"/>
+          <p:cNvSpPr txBox="1"/>
+          <p:nvPr/>
+        </p:nvSpPr>
+        <p:spPr>
+          <a:xfrm>
+            <a:off x="7823695" y="3382978"/>
+            <a:ext cx="1408655" cy="369332"/>
+          </a:xfrm>
+          <a:prstGeom prst="rect">
+            <a:avLst/>
+          </a:prstGeom>
+          <a:noFill/>
+        </p:spPr>
+        <p:txBody>
+          <a:bodyPr wrap="none" rtlCol="0">
+            <a:spAutoFit/>
+          </a:bodyPr>
+          <a:lstStyle/>
+          <a:p>
+            <a:r>
+              <a:rPr lang="en-US" dirty="0" smtClean="0"/>
+              <a:t>Predator kills</a:t>
+            </a:r>
+            <a:endParaRPr lang="en-US" dirty="0"/>
+          </a:p>
+        </p:txBody>
+      </p:sp>
+      <p:sp>
+        <p:nvSpPr>
+          <p:cNvPr id="9" name="TextBox 8"/>
+          <p:cNvSpPr txBox="1"/>
+          <p:nvPr/>
+        </p:nvSpPr>
+        <p:spPr>
+          <a:xfrm>
+            <a:off x="6303831" y="3752310"/>
+            <a:ext cx="1894832" cy="2862323"/>
+          </a:xfrm>
+          <a:prstGeom prst="rect">
+            <a:avLst/>
+          </a:prstGeom>
+          <a:noFill/>
+          <a:ln>
+            <a:solidFill>
+              <a:srgbClr val="000000"/>
+            </a:solidFill>
+          </a:ln>
+        </p:spPr>
+        <p:txBody>
+          <a:bodyPr wrap="none" rtlCol="0">
+            <a:spAutoFit/>
+          </a:bodyPr>
+          <a:lstStyle/>
+          <a:p>
+            <a:r>
+              <a:rPr lang="en-US" b="1" dirty="0"/>
+              <a:t>Predator</a:t>
+            </a:r>
+          </a:p>
+          <a:p>
+            <a:endParaRPr lang="en-US" dirty="0"/>
+          </a:p>
+          <a:p>
+            <a:r>
+              <a:rPr lang="en-US" dirty="0"/>
+              <a:t>Endowment = €10</a:t>
+            </a:r>
+          </a:p>
+          <a:p>
+            <a:endParaRPr lang="en-US" dirty="0"/>
+          </a:p>
+          <a:p>
+            <a:endParaRPr lang="en-US" dirty="0"/>
+          </a:p>
+          <a:p>
+            <a:r>
+              <a:rPr lang="en-US" dirty="0"/>
+              <a:t>Investment = €5</a:t>
+            </a:r>
+          </a:p>
+          <a:p>
+            <a:endParaRPr lang="en-US" dirty="0"/>
+          </a:p>
+          <a:p>
+            <a:endParaRPr lang="en-US" dirty="0"/>
+          </a:p>
+          <a:p>
+            <a:r>
+              <a:rPr lang="en-US" u="sng" dirty="0"/>
+              <a:t>Payout </a:t>
+            </a:r>
+          </a:p>
+          <a:p>
+            <a:r>
+              <a:rPr lang="en-US" dirty="0"/>
+              <a:t>10-5+(10-4) = €11</a:t>
+            </a:r>
+          </a:p>
+        </p:txBody>
+      </p:sp>
+      <p:sp>
+        <p:nvSpPr>
+          <p:cNvPr id="10" name="TextBox 9"/>
+          <p:cNvSpPr txBox="1"/>
+          <p:nvPr/>
+        </p:nvSpPr>
+        <p:spPr>
+          <a:xfrm>
+            <a:off x="8652860" y="3752310"/>
+            <a:ext cx="1894832" cy="2862323"/>
+          </a:xfrm>
+          <a:prstGeom prst="rect">
+            <a:avLst/>
+          </a:prstGeom>
+          <a:noFill/>
+          <a:ln>
+            <a:solidFill>
+              <a:srgbClr val="000000"/>
+            </a:solidFill>
+          </a:ln>
+        </p:spPr>
+        <p:txBody>
+          <a:bodyPr wrap="none" rtlCol="0">
+            <a:spAutoFit/>
+          </a:bodyPr>
+          <a:lstStyle/>
+          <a:p>
+            <a:r>
+              <a:rPr lang="en-US" b="1" dirty="0"/>
+              <a:t>Prey</a:t>
+            </a:r>
+          </a:p>
+          <a:p>
+            <a:endParaRPr lang="en-US" dirty="0"/>
+          </a:p>
+          <a:p>
+            <a:r>
+              <a:rPr lang="en-US" dirty="0"/>
+              <a:t>Endowment = €10</a:t>
+            </a:r>
+          </a:p>
+          <a:p>
+            <a:endParaRPr lang="en-US" dirty="0"/>
+          </a:p>
+          <a:p>
+            <a:endParaRPr lang="en-US" dirty="0"/>
+          </a:p>
+          <a:p>
+            <a:r>
+              <a:rPr lang="en-US" dirty="0"/>
+              <a:t>Investment = €4</a:t>
+            </a:r>
+          </a:p>
+          <a:p>
+            <a:endParaRPr lang="en-US" dirty="0"/>
+          </a:p>
+          <a:p>
+            <a:endParaRPr lang="en-US" dirty="0"/>
+          </a:p>
+          <a:p>
+            <a:r>
+              <a:rPr lang="en-US" u="sng" dirty="0"/>
+              <a:t>Payout </a:t>
+            </a:r>
+          </a:p>
+          <a:p>
+            <a:r>
+              <a:rPr lang="en-US" dirty="0"/>
+              <a:t>€0</a:t>
+            </a:r>
+          </a:p>
+        </p:txBody>
+      </p:sp>
+    </p:spTree>
+    <p:extLst>
+      <p:ext uri="{BB962C8B-B14F-4D97-AF65-F5344CB8AC3E}">
+        <p14:creationId xmlns:p14="http://schemas.microsoft.com/office/powerpoint/2010/main" val="1334033000"/>
+      </p:ext>
+    </p:extLst>
+  </p:cSld>
+  <p:clrMapOvr>
+    <a:masterClrMapping/>
+  </p:clrMapOvr>
+  <p:timing>
+    <p:tnLst>
+      <p:par>
+        <p:cTn id="1" dur="indefinite" restart="never" nodeType="tmRoot"/>
+      </p:par>
+    </p:tnLst>
+  </p:timing>
+</p:sld>
+</file>
+
+<file path=ppt/slides/slide30.xml><?xml version="1.0" encoding="utf-8"?>
 <p:sld xmlns:a="http://schemas.openxmlformats.org/drawingml/2006/main" xmlns:r="http://schemas.openxmlformats.org/officeDocument/2006/relationships" xmlns:p="http://schemas.openxmlformats.org/presentationml/2006/main">
   <p:cSld>
     <p:spTree>
@@ -10909,7 +12585,7 @@
 </p:sld>
 </file>
 
-<file path=ppt/slides/slide28.xml><?xml version="1.0" encoding="utf-8"?>
+<file path=ppt/slides/slide31.xml><?xml version="1.0" encoding="utf-8"?>
 <p:sld xmlns:a="http://schemas.openxmlformats.org/drawingml/2006/main" xmlns:r="http://schemas.openxmlformats.org/officeDocument/2006/relationships" xmlns:p="http://schemas.openxmlformats.org/presentationml/2006/main">
   <p:cSld>
     <p:spTree>
@@ -11050,7 +12726,7 @@
 </p:sld>
 </file>
 
-<file path=ppt/slides/slide29.xml><?xml version="1.0" encoding="utf-8"?>
+<file path=ppt/slides/slide32.xml><?xml version="1.0" encoding="utf-8"?>
 <p:sld xmlns:a="http://schemas.openxmlformats.org/drawingml/2006/main" xmlns:r="http://schemas.openxmlformats.org/officeDocument/2006/relationships" xmlns:p="http://schemas.openxmlformats.org/presentationml/2006/main">
   <p:cSld>
     <p:spTree>
@@ -11346,505 +13022,7 @@
 </p:sld>
 </file>
 
-<file path=ppt/slides/slide3.xml><?xml version="1.0" encoding="utf-8"?>
-<p:sld xmlns:a="http://schemas.openxmlformats.org/drawingml/2006/main" xmlns:r="http://schemas.openxmlformats.org/officeDocument/2006/relationships" xmlns:p="http://schemas.openxmlformats.org/presentationml/2006/main">
-  <p:cSld>
-    <p:spTree>
-      <p:nvGrpSpPr>
-        <p:cNvPr id="1" name=""/>
-        <p:cNvGrpSpPr/>
-        <p:nvPr/>
-      </p:nvGrpSpPr>
-      <p:grpSpPr>
-        <a:xfrm>
-          <a:off x="0" y="0"/>
-          <a:ext cx="0" cy="0"/>
-          <a:chOff x="0" y="0"/>
-          <a:chExt cx="0" cy="0"/>
-        </a:xfrm>
-      </p:grpSpPr>
-      <p:sp>
-        <p:nvSpPr>
-          <p:cNvPr id="2" name="TextBox 1"/>
-          <p:cNvSpPr txBox="1"/>
-          <p:nvPr/>
-        </p:nvSpPr>
-        <p:spPr>
-          <a:xfrm>
-            <a:off x="4698124" y="609600"/>
-            <a:ext cx="2481449" cy="369332"/>
-          </a:xfrm>
-          <a:prstGeom prst="rect">
-            <a:avLst/>
-          </a:prstGeom>
-          <a:noFill/>
-        </p:spPr>
-        <p:txBody>
-          <a:bodyPr wrap="none" rtlCol="0">
-            <a:spAutoFit/>
-          </a:bodyPr>
-          <a:lstStyle/>
-          <a:p>
-            <a:r>
-              <a:rPr lang="en-US" dirty="0" smtClean="0"/>
-              <a:t>The Predator Prey Game</a:t>
-            </a:r>
-            <a:endParaRPr lang="en-US" dirty="0"/>
-          </a:p>
-        </p:txBody>
-      </p:sp>
-      <p:sp>
-        <p:nvSpPr>
-          <p:cNvPr id="5" name="TextBox 4"/>
-          <p:cNvSpPr txBox="1"/>
-          <p:nvPr/>
-        </p:nvSpPr>
-        <p:spPr>
-          <a:xfrm>
-            <a:off x="529021" y="1091906"/>
-            <a:ext cx="7721599" cy="2308324"/>
-          </a:xfrm>
-          <a:prstGeom prst="rect">
-            <a:avLst/>
-          </a:prstGeom>
-          <a:noFill/>
-        </p:spPr>
-        <p:txBody>
-          <a:bodyPr wrap="square" rtlCol="0">
-            <a:spAutoFit/>
-          </a:bodyPr>
-          <a:lstStyle/>
-          <a:p>
-            <a:r>
-              <a:rPr lang="en-US" dirty="0" smtClean="0"/>
-              <a:t>Two-player, one-shot design</a:t>
-            </a:r>
-          </a:p>
-          <a:p>
-            <a:r>
-              <a:rPr lang="en-US" dirty="0" smtClean="0"/>
-              <a:t>Rules</a:t>
-            </a:r>
-            <a:endParaRPr lang="en-US" dirty="0"/>
-          </a:p>
-          <a:p>
-            <a:pPr marL="285750" indent="-285750">
-              <a:buFont typeface="Arial" charset="0"/>
-              <a:buChar char="•"/>
-            </a:pPr>
-            <a:r>
-              <a:rPr lang="en-US" dirty="0"/>
-              <a:t>Each player starts with €</a:t>
-            </a:r>
-            <a:r>
-              <a:rPr lang="en-US" dirty="0" smtClean="0"/>
-              <a:t>10</a:t>
-            </a:r>
-            <a:endParaRPr lang="en-US" dirty="0"/>
-          </a:p>
-          <a:p>
-            <a:pPr marL="285750" indent="-285750">
-              <a:buFont typeface="Arial" charset="0"/>
-              <a:buChar char="•"/>
-            </a:pPr>
-            <a:r>
-              <a:rPr lang="en-US" dirty="0"/>
-              <a:t>If the prey invests as much or more than the predator, both keep their remaining </a:t>
-            </a:r>
-            <a:r>
-              <a:rPr lang="en-US" dirty="0" smtClean="0"/>
-              <a:t>endowment</a:t>
-            </a:r>
-            <a:endParaRPr lang="en-US" dirty="0"/>
-          </a:p>
-          <a:p>
-            <a:pPr marL="285750" indent="-285750">
-              <a:buFont typeface="Arial" charset="0"/>
-              <a:buChar char="•"/>
-            </a:pPr>
-            <a:r>
-              <a:rPr lang="en-US" dirty="0"/>
-              <a:t>If the predator invests more than the prey, predator adds preys remainder to his own remainder.</a:t>
-            </a:r>
-          </a:p>
-          <a:p>
-            <a:endParaRPr lang="en-US" dirty="0"/>
-          </a:p>
-        </p:txBody>
-      </p:sp>
-      <p:sp>
-        <p:nvSpPr>
-          <p:cNvPr id="6" name="TextBox 5"/>
-          <p:cNvSpPr txBox="1"/>
-          <p:nvPr/>
-        </p:nvSpPr>
-        <p:spPr>
-          <a:xfrm>
-            <a:off x="1319549" y="3752310"/>
-            <a:ext cx="1894832" cy="2862323"/>
-          </a:xfrm>
-          <a:prstGeom prst="rect">
-            <a:avLst/>
-          </a:prstGeom>
-          <a:noFill/>
-          <a:ln>
-            <a:solidFill>
-              <a:srgbClr val="000000"/>
-            </a:solidFill>
-          </a:ln>
-        </p:spPr>
-        <p:txBody>
-          <a:bodyPr wrap="none" rtlCol="0">
-            <a:spAutoFit/>
-          </a:bodyPr>
-          <a:lstStyle/>
-          <a:p>
-            <a:r>
-              <a:rPr lang="en-US" b="1" dirty="0"/>
-              <a:t>Predator</a:t>
-            </a:r>
-          </a:p>
-          <a:p>
-            <a:endParaRPr lang="en-US" dirty="0"/>
-          </a:p>
-          <a:p>
-            <a:r>
-              <a:rPr lang="en-US" dirty="0"/>
-              <a:t>Endowment = €10</a:t>
-            </a:r>
-          </a:p>
-          <a:p>
-            <a:endParaRPr lang="en-US" dirty="0"/>
-          </a:p>
-          <a:p>
-            <a:endParaRPr lang="en-US" dirty="0"/>
-          </a:p>
-          <a:p>
-            <a:r>
-              <a:rPr lang="en-US" dirty="0"/>
-              <a:t>Investment = €3</a:t>
-            </a:r>
-          </a:p>
-          <a:p>
-            <a:endParaRPr lang="en-US" dirty="0"/>
-          </a:p>
-          <a:p>
-            <a:endParaRPr lang="en-US" dirty="0"/>
-          </a:p>
-          <a:p>
-            <a:r>
-              <a:rPr lang="en-US" u="sng" dirty="0"/>
-              <a:t>Payout </a:t>
-            </a:r>
-          </a:p>
-          <a:p>
-            <a:r>
-              <a:rPr lang="en-US" dirty="0"/>
-              <a:t>10-3 = €7</a:t>
-            </a:r>
-          </a:p>
-        </p:txBody>
-      </p:sp>
-      <p:sp>
-        <p:nvSpPr>
-          <p:cNvPr id="7" name="TextBox 6"/>
-          <p:cNvSpPr txBox="1"/>
-          <p:nvPr/>
-        </p:nvSpPr>
-        <p:spPr>
-          <a:xfrm>
-            <a:off x="3671023" y="3752310"/>
-            <a:ext cx="1894832" cy="2862323"/>
-          </a:xfrm>
-          <a:prstGeom prst="rect">
-            <a:avLst/>
-          </a:prstGeom>
-          <a:noFill/>
-          <a:ln>
-            <a:solidFill>
-              <a:srgbClr val="000000"/>
-            </a:solidFill>
-          </a:ln>
-        </p:spPr>
-        <p:txBody>
-          <a:bodyPr wrap="none" rtlCol="0">
-            <a:spAutoFit/>
-          </a:bodyPr>
-          <a:lstStyle/>
-          <a:p>
-            <a:r>
-              <a:rPr lang="en-US" b="1" dirty="0"/>
-              <a:t>Prey</a:t>
-            </a:r>
-          </a:p>
-          <a:p>
-            <a:endParaRPr lang="en-US" dirty="0"/>
-          </a:p>
-          <a:p>
-            <a:r>
-              <a:rPr lang="en-US" dirty="0"/>
-              <a:t>Endowment = €10</a:t>
-            </a:r>
-          </a:p>
-          <a:p>
-            <a:endParaRPr lang="en-US" dirty="0"/>
-          </a:p>
-          <a:p>
-            <a:endParaRPr lang="en-US" dirty="0"/>
-          </a:p>
-          <a:p>
-            <a:r>
-              <a:rPr lang="en-US" dirty="0"/>
-              <a:t>Investment = €4</a:t>
-            </a:r>
-          </a:p>
-          <a:p>
-            <a:endParaRPr lang="en-US" dirty="0"/>
-          </a:p>
-          <a:p>
-            <a:endParaRPr lang="en-US" dirty="0"/>
-          </a:p>
-          <a:p>
-            <a:r>
-              <a:rPr lang="en-US" u="sng" dirty="0"/>
-              <a:t>Payout </a:t>
-            </a:r>
-          </a:p>
-          <a:p>
-            <a:r>
-              <a:rPr lang="en-US" dirty="0"/>
-              <a:t>10-4 = €6</a:t>
-            </a:r>
-          </a:p>
-        </p:txBody>
-      </p:sp>
-      <p:sp>
-        <p:nvSpPr>
-          <p:cNvPr id="3" name="TextBox 2"/>
-          <p:cNvSpPr txBox="1"/>
-          <p:nvPr/>
-        </p:nvSpPr>
-        <p:spPr>
-          <a:xfrm>
-            <a:off x="2861206" y="3382978"/>
-            <a:ext cx="1409745" cy="369332"/>
-          </a:xfrm>
-          <a:prstGeom prst="rect">
-            <a:avLst/>
-          </a:prstGeom>
-          <a:noFill/>
-        </p:spPr>
-        <p:txBody>
-          <a:bodyPr wrap="none" rtlCol="0">
-            <a:spAutoFit/>
-          </a:bodyPr>
-          <a:lstStyle/>
-          <a:p>
-            <a:r>
-              <a:rPr lang="en-US" dirty="0" smtClean="0"/>
-              <a:t>Prey survives</a:t>
-            </a:r>
-            <a:endParaRPr lang="en-US" dirty="0"/>
-          </a:p>
-        </p:txBody>
-      </p:sp>
-      <p:sp>
-        <p:nvSpPr>
-          <p:cNvPr id="8" name="TextBox 7"/>
-          <p:cNvSpPr txBox="1"/>
-          <p:nvPr/>
-        </p:nvSpPr>
-        <p:spPr>
-          <a:xfrm>
-            <a:off x="7823695" y="3382978"/>
-            <a:ext cx="1408655" cy="369332"/>
-          </a:xfrm>
-          <a:prstGeom prst="rect">
-            <a:avLst/>
-          </a:prstGeom>
-          <a:noFill/>
-        </p:spPr>
-        <p:txBody>
-          <a:bodyPr wrap="none" rtlCol="0">
-            <a:spAutoFit/>
-          </a:bodyPr>
-          <a:lstStyle/>
-          <a:p>
-            <a:r>
-              <a:rPr lang="en-US" dirty="0" smtClean="0"/>
-              <a:t>Predator kills</a:t>
-            </a:r>
-            <a:endParaRPr lang="en-US" dirty="0"/>
-          </a:p>
-        </p:txBody>
-      </p:sp>
-      <p:sp>
-        <p:nvSpPr>
-          <p:cNvPr id="9" name="TextBox 8"/>
-          <p:cNvSpPr txBox="1"/>
-          <p:nvPr/>
-        </p:nvSpPr>
-        <p:spPr>
-          <a:xfrm>
-            <a:off x="6303831" y="3752310"/>
-            <a:ext cx="1894832" cy="2862323"/>
-          </a:xfrm>
-          <a:prstGeom prst="rect">
-            <a:avLst/>
-          </a:prstGeom>
-          <a:noFill/>
-          <a:ln>
-            <a:solidFill>
-              <a:srgbClr val="000000"/>
-            </a:solidFill>
-          </a:ln>
-        </p:spPr>
-        <p:txBody>
-          <a:bodyPr wrap="none" rtlCol="0">
-            <a:spAutoFit/>
-          </a:bodyPr>
-          <a:lstStyle/>
-          <a:p>
-            <a:r>
-              <a:rPr lang="en-US" b="1" dirty="0"/>
-              <a:t>Predator</a:t>
-            </a:r>
-          </a:p>
-          <a:p>
-            <a:endParaRPr lang="en-US" dirty="0"/>
-          </a:p>
-          <a:p>
-            <a:r>
-              <a:rPr lang="en-US" dirty="0"/>
-              <a:t>Endowment = €10</a:t>
-            </a:r>
-          </a:p>
-          <a:p>
-            <a:endParaRPr lang="en-US" dirty="0"/>
-          </a:p>
-          <a:p>
-            <a:endParaRPr lang="en-US" dirty="0"/>
-          </a:p>
-          <a:p>
-            <a:r>
-              <a:rPr lang="en-US" dirty="0"/>
-              <a:t>Investment = €5</a:t>
-            </a:r>
-          </a:p>
-          <a:p>
-            <a:endParaRPr lang="en-US" dirty="0"/>
-          </a:p>
-          <a:p>
-            <a:endParaRPr lang="en-US" dirty="0"/>
-          </a:p>
-          <a:p>
-            <a:r>
-              <a:rPr lang="en-US" u="sng" dirty="0"/>
-              <a:t>Payout </a:t>
-            </a:r>
-          </a:p>
-          <a:p>
-            <a:r>
-              <a:rPr lang="en-US" dirty="0"/>
-              <a:t>10-5+(10-4) = €11</a:t>
-            </a:r>
-          </a:p>
-        </p:txBody>
-      </p:sp>
-      <p:sp>
-        <p:nvSpPr>
-          <p:cNvPr id="10" name="TextBox 9"/>
-          <p:cNvSpPr txBox="1"/>
-          <p:nvPr/>
-        </p:nvSpPr>
-        <p:spPr>
-          <a:xfrm>
-            <a:off x="8652860" y="3752310"/>
-            <a:ext cx="1894832" cy="2862323"/>
-          </a:xfrm>
-          <a:prstGeom prst="rect">
-            <a:avLst/>
-          </a:prstGeom>
-          <a:noFill/>
-          <a:ln>
-            <a:solidFill>
-              <a:srgbClr val="000000"/>
-            </a:solidFill>
-          </a:ln>
-        </p:spPr>
-        <p:txBody>
-          <a:bodyPr wrap="none" rtlCol="0">
-            <a:spAutoFit/>
-          </a:bodyPr>
-          <a:lstStyle/>
-          <a:p>
-            <a:r>
-              <a:rPr lang="en-US" b="1" dirty="0"/>
-              <a:t>Prey</a:t>
-            </a:r>
-          </a:p>
-          <a:p>
-            <a:endParaRPr lang="en-US" dirty="0"/>
-          </a:p>
-          <a:p>
-            <a:r>
-              <a:rPr lang="en-US" dirty="0"/>
-              <a:t>Endowment = €10</a:t>
-            </a:r>
-          </a:p>
-          <a:p>
-            <a:endParaRPr lang="en-US" dirty="0"/>
-          </a:p>
-          <a:p>
-            <a:endParaRPr lang="en-US" dirty="0"/>
-          </a:p>
-          <a:p>
-            <a:r>
-              <a:rPr lang="en-US" dirty="0"/>
-              <a:t>Investment = €4</a:t>
-            </a:r>
-          </a:p>
-          <a:p>
-            <a:endParaRPr lang="en-US" dirty="0"/>
-          </a:p>
-          <a:p>
-            <a:endParaRPr lang="en-US" dirty="0"/>
-          </a:p>
-          <a:p>
-            <a:r>
-              <a:rPr lang="en-US" u="sng" dirty="0"/>
-              <a:t>Payout </a:t>
-            </a:r>
-          </a:p>
-          <a:p>
-            <a:r>
-              <a:rPr lang="en-US" dirty="0"/>
-              <a:t>€0</a:t>
-            </a:r>
-          </a:p>
-        </p:txBody>
-      </p:sp>
-    </p:spTree>
-    <p:extLst>
-      <p:ext uri="{BB962C8B-B14F-4D97-AF65-F5344CB8AC3E}">
-        <p14:creationId xmlns:p14="http://schemas.microsoft.com/office/powerpoint/2010/main" val="1334033000"/>
-      </p:ext>
-    </p:extLst>
-  </p:cSld>
-  <p:clrMapOvr>
-    <a:masterClrMapping/>
-  </p:clrMapOvr>
-  <p:timing>
-    <p:tnLst>
-      <p:par>
-        <p:cTn id="1" dur="indefinite" restart="never" nodeType="tmRoot"/>
-      </p:par>
-    </p:tnLst>
-  </p:timing>
-</p:sld>
-</file>
-
-<file path=ppt/slides/slide30.xml><?xml version="1.0" encoding="utf-8"?>
+<file path=ppt/slides/slide33.xml><?xml version="1.0" encoding="utf-8"?>
 <p:sld xmlns:a="http://schemas.openxmlformats.org/drawingml/2006/main" xmlns:r="http://schemas.openxmlformats.org/officeDocument/2006/relationships" xmlns:p="http://schemas.openxmlformats.org/presentationml/2006/main">
   <p:cSld>
     <p:spTree>
@@ -12163,7 +13341,7 @@
 </p:sld>
 </file>
 
-<file path=ppt/slides/slide31.xml><?xml version="1.0" encoding="utf-8"?>
+<file path=ppt/slides/slide34.xml><?xml version="1.0" encoding="utf-8"?>
 <p:sld xmlns:a="http://schemas.openxmlformats.org/drawingml/2006/main" xmlns:r="http://schemas.openxmlformats.org/officeDocument/2006/relationships" xmlns:p="http://schemas.openxmlformats.org/presentationml/2006/main">
   <p:cSld>
     <p:spTree>
@@ -12304,7 +13482,7 @@
 </p:sld>
 </file>
 
-<file path=ppt/slides/slide32.xml><?xml version="1.0" encoding="utf-8"?>
+<file path=ppt/slides/slide35.xml><?xml version="1.0" encoding="utf-8"?>
 <p:sld xmlns:a="http://schemas.openxmlformats.org/drawingml/2006/main" xmlns:r="http://schemas.openxmlformats.org/officeDocument/2006/relationships" xmlns:p="http://schemas.openxmlformats.org/presentationml/2006/main">
   <p:cSld>
     <p:spTree>
@@ -12485,7 +13663,7 @@
 </p:sld>
 </file>
 
-<file path=ppt/slides/slide33.xml><?xml version="1.0" encoding="utf-8"?>
+<file path=ppt/slides/slide36.xml><?xml version="1.0" encoding="utf-8"?>
 <p:sld xmlns:a="http://schemas.openxmlformats.org/drawingml/2006/main" xmlns:r="http://schemas.openxmlformats.org/officeDocument/2006/relationships" xmlns:p="http://schemas.openxmlformats.org/presentationml/2006/main">
   <p:cSld>
     <p:spTree>
@@ -12630,7 +13808,7 @@
 </p:sld>
 </file>
 
-<file path=ppt/slides/slide34.xml><?xml version="1.0" encoding="utf-8"?>
+<file path=ppt/slides/slide37.xml><?xml version="1.0" encoding="utf-8"?>
 <p:sld xmlns:a="http://schemas.openxmlformats.org/drawingml/2006/main" xmlns:r="http://schemas.openxmlformats.org/officeDocument/2006/relationships" xmlns:p="http://schemas.openxmlformats.org/presentationml/2006/main">
   <p:cSld>
     <p:spTree>
@@ -13646,7 +14824,7 @@
 </p:sld>
 </file>
 
-<file path=ppt/slides/slide35.xml><?xml version="1.0" encoding="utf-8"?>
+<file path=ppt/slides/slide38.xml><?xml version="1.0" encoding="utf-8"?>
 <p:sld xmlns:a="http://schemas.openxmlformats.org/drawingml/2006/main" xmlns:r="http://schemas.openxmlformats.org/officeDocument/2006/relationships" xmlns:p="http://schemas.openxmlformats.org/presentationml/2006/main">
   <p:cSld>
     <p:spTree>
@@ -14519,7 +15697,7 @@
 </p:sld>
 </file>
 
-<file path=ppt/slides/slide36.xml><?xml version="1.0" encoding="utf-8"?>
+<file path=ppt/slides/slide39.xml><?xml version="1.0" encoding="utf-8"?>
 <p:sld xmlns:a="http://schemas.openxmlformats.org/drawingml/2006/main" xmlns:r="http://schemas.openxmlformats.org/officeDocument/2006/relationships" xmlns:p="http://schemas.openxmlformats.org/presentationml/2006/main">
   <p:cSld>
     <p:spTree>
@@ -15209,7 +16387,149 @@
 </p:sld>
 </file>
 
-<file path=ppt/slides/slide37.xml><?xml version="1.0" encoding="utf-8"?>
+<file path=ppt/slides/slide4.xml><?xml version="1.0" encoding="utf-8"?>
+<p:sld xmlns:a="http://schemas.openxmlformats.org/drawingml/2006/main" xmlns:r="http://schemas.openxmlformats.org/officeDocument/2006/relationships" xmlns:p="http://schemas.openxmlformats.org/presentationml/2006/main">
+  <p:cSld>
+    <p:spTree>
+      <p:nvGrpSpPr>
+        <p:cNvPr id="1" name=""/>
+        <p:cNvGrpSpPr/>
+        <p:nvPr/>
+      </p:nvGrpSpPr>
+      <p:grpSpPr>
+        <a:xfrm>
+          <a:off x="0" y="0"/>
+          <a:ext cx="0" cy="0"/>
+          <a:chOff x="0" y="0"/>
+          <a:chExt cx="0" cy="0"/>
+        </a:xfrm>
+      </p:grpSpPr>
+      <p:sp>
+        <p:nvSpPr>
+          <p:cNvPr id="2" name="TextBox 1"/>
+          <p:cNvSpPr txBox="1"/>
+          <p:nvPr/>
+        </p:nvSpPr>
+        <p:spPr>
+          <a:xfrm>
+            <a:off x="4698124" y="609600"/>
+            <a:ext cx="2595134" cy="369332"/>
+          </a:xfrm>
+          <a:prstGeom prst="rect">
+            <a:avLst/>
+          </a:prstGeom>
+          <a:noFill/>
+        </p:spPr>
+        <p:txBody>
+          <a:bodyPr wrap="none" rtlCol="0">
+            <a:spAutoFit/>
+          </a:bodyPr>
+          <a:lstStyle/>
+          <a:p>
+            <a:r>
+              <a:rPr lang="en-US" dirty="0" smtClean="0"/>
+              <a:t>What do our subjects do?</a:t>
+            </a:r>
+            <a:endParaRPr lang="en-US" dirty="0"/>
+          </a:p>
+        </p:txBody>
+      </p:sp>
+      <p:sp>
+        <p:nvSpPr>
+          <p:cNvPr id="4" name="TextBox 3"/>
+          <p:cNvSpPr txBox="1"/>
+          <p:nvPr/>
+        </p:nvSpPr>
+        <p:spPr>
+          <a:xfrm>
+            <a:off x="2874578" y="2017987"/>
+            <a:ext cx="6090745" cy="1754326"/>
+          </a:xfrm>
+          <a:prstGeom prst="rect">
+            <a:avLst/>
+          </a:prstGeom>
+          <a:noFill/>
+        </p:spPr>
+        <p:txBody>
+          <a:bodyPr wrap="square" rtlCol="0">
+            <a:spAutoFit/>
+          </a:bodyPr>
+          <a:lstStyle/>
+          <a:p>
+            <a:r>
+              <a:rPr lang="en-US" dirty="0" smtClean="0"/>
+              <a:t>Behavioral plots (simple </a:t>
+            </a:r>
+            <a:r>
+              <a:rPr lang="en-US" dirty="0" err="1" smtClean="0"/>
+              <a:t>barplots</a:t>
+            </a:r>
+            <a:r>
+              <a:rPr lang="en-US" dirty="0" smtClean="0"/>
+              <a:t>)</a:t>
+            </a:r>
+          </a:p>
+          <a:p>
+            <a:pPr marL="285750" indent="-285750">
+              <a:buFont typeface="Arial" charset="0"/>
+              <a:buChar char="•"/>
+            </a:pPr>
+            <a:r>
+              <a:rPr lang="en-US" dirty="0" smtClean="0"/>
+              <a:t>Predators invest lower than prey</a:t>
+            </a:r>
+          </a:p>
+          <a:p>
+            <a:pPr marL="285750" indent="-285750">
+              <a:buFont typeface="Arial" charset="0"/>
+              <a:buChar char="•"/>
+            </a:pPr>
+            <a:r>
+              <a:rPr lang="en-US" dirty="0" smtClean="0"/>
+              <a:t>Predators invest much less frequently than prey</a:t>
+            </a:r>
+            <a:endParaRPr lang="en-US" dirty="0"/>
+          </a:p>
+          <a:p>
+            <a:r>
+              <a:rPr lang="en-US" dirty="0" smtClean="0"/>
+              <a:t>In hormone dataset (maybe in both)</a:t>
+            </a:r>
+          </a:p>
+          <a:p>
+            <a:pPr marL="285750" indent="-285750">
+              <a:buFont typeface="Arial" charset="0"/>
+              <a:buChar char="•"/>
+            </a:pPr>
+            <a:r>
+              <a:rPr lang="en-US" dirty="0" smtClean="0"/>
+              <a:t>Previous reward impacts current trial, and this is more pronounced in prey than in predators</a:t>
+            </a:r>
+            <a:endParaRPr lang="en-US" dirty="0"/>
+          </a:p>
+        </p:txBody>
+      </p:sp>
+    </p:spTree>
+    <p:extLst>
+      <p:ext uri="{BB962C8B-B14F-4D97-AF65-F5344CB8AC3E}">
+        <p14:creationId xmlns:p14="http://schemas.microsoft.com/office/powerpoint/2010/main" val="228006838"/>
+      </p:ext>
+    </p:extLst>
+  </p:cSld>
+  <p:clrMapOvr>
+    <a:masterClrMapping/>
+  </p:clrMapOvr>
+  <p:timing>
+    <p:tnLst>
+      <p:par>
+        <p:cTn id="1" dur="indefinite" restart="never" nodeType="tmRoot"/>
+      </p:par>
+    </p:tnLst>
+  </p:timing>
+</p:sld>
+</file>
+
+<file path=ppt/slides/slide40.xml><?xml version="1.0" encoding="utf-8"?>
 <p:sld xmlns:a="http://schemas.openxmlformats.org/drawingml/2006/main" xmlns:r="http://schemas.openxmlformats.org/officeDocument/2006/relationships" xmlns:p="http://schemas.openxmlformats.org/presentationml/2006/main">
   <p:cSld>
     <p:spTree>
@@ -16335,148 +17655,6 @@
     <p:extLst>
       <p:ext uri="{BB962C8B-B14F-4D97-AF65-F5344CB8AC3E}">
         <p14:creationId xmlns:p14="http://schemas.microsoft.com/office/powerpoint/2010/main" val="1598760859"/>
-      </p:ext>
-    </p:extLst>
-  </p:cSld>
-  <p:clrMapOvr>
-    <a:masterClrMapping/>
-  </p:clrMapOvr>
-  <p:timing>
-    <p:tnLst>
-      <p:par>
-        <p:cTn id="1" dur="indefinite" restart="never" nodeType="tmRoot"/>
-      </p:par>
-    </p:tnLst>
-  </p:timing>
-</p:sld>
-</file>
-
-<file path=ppt/slides/slide4.xml><?xml version="1.0" encoding="utf-8"?>
-<p:sld xmlns:a="http://schemas.openxmlformats.org/drawingml/2006/main" xmlns:r="http://schemas.openxmlformats.org/officeDocument/2006/relationships" xmlns:p="http://schemas.openxmlformats.org/presentationml/2006/main">
-  <p:cSld>
-    <p:spTree>
-      <p:nvGrpSpPr>
-        <p:cNvPr id="1" name=""/>
-        <p:cNvGrpSpPr/>
-        <p:nvPr/>
-      </p:nvGrpSpPr>
-      <p:grpSpPr>
-        <a:xfrm>
-          <a:off x="0" y="0"/>
-          <a:ext cx="0" cy="0"/>
-          <a:chOff x="0" y="0"/>
-          <a:chExt cx="0" cy="0"/>
-        </a:xfrm>
-      </p:grpSpPr>
-      <p:sp>
-        <p:nvSpPr>
-          <p:cNvPr id="2" name="TextBox 1"/>
-          <p:cNvSpPr txBox="1"/>
-          <p:nvPr/>
-        </p:nvSpPr>
-        <p:spPr>
-          <a:xfrm>
-            <a:off x="4698124" y="609600"/>
-            <a:ext cx="2595134" cy="369332"/>
-          </a:xfrm>
-          <a:prstGeom prst="rect">
-            <a:avLst/>
-          </a:prstGeom>
-          <a:noFill/>
-        </p:spPr>
-        <p:txBody>
-          <a:bodyPr wrap="none" rtlCol="0">
-            <a:spAutoFit/>
-          </a:bodyPr>
-          <a:lstStyle/>
-          <a:p>
-            <a:r>
-              <a:rPr lang="en-US" dirty="0" smtClean="0"/>
-              <a:t>What do our subjects do?</a:t>
-            </a:r>
-            <a:endParaRPr lang="en-US" dirty="0"/>
-          </a:p>
-        </p:txBody>
-      </p:sp>
-      <p:sp>
-        <p:nvSpPr>
-          <p:cNvPr id="4" name="TextBox 3"/>
-          <p:cNvSpPr txBox="1"/>
-          <p:nvPr/>
-        </p:nvSpPr>
-        <p:spPr>
-          <a:xfrm>
-            <a:off x="2874578" y="2017987"/>
-            <a:ext cx="6090745" cy="1754326"/>
-          </a:xfrm>
-          <a:prstGeom prst="rect">
-            <a:avLst/>
-          </a:prstGeom>
-          <a:noFill/>
-        </p:spPr>
-        <p:txBody>
-          <a:bodyPr wrap="square" rtlCol="0">
-            <a:spAutoFit/>
-          </a:bodyPr>
-          <a:lstStyle/>
-          <a:p>
-            <a:r>
-              <a:rPr lang="en-US" dirty="0" smtClean="0"/>
-              <a:t>Behavioral plots (simple </a:t>
-            </a:r>
-            <a:r>
-              <a:rPr lang="en-US" dirty="0" err="1" smtClean="0"/>
-              <a:t>barplots</a:t>
-            </a:r>
-            <a:r>
-              <a:rPr lang="en-US" dirty="0" smtClean="0"/>
-              <a:t>)</a:t>
-            </a:r>
-          </a:p>
-          <a:p>
-            <a:pPr marL="285750" indent="-285750">
-              <a:buFont typeface="Arial" charset="0"/>
-              <a:buChar char="•"/>
-            </a:pPr>
-            <a:r>
-              <a:rPr lang="en-US" dirty="0" smtClean="0"/>
-              <a:t>Predators invest lower than prey</a:t>
-            </a:r>
-          </a:p>
-          <a:p>
-            <a:pPr marL="285750" indent="-285750">
-              <a:buFont typeface="Arial" charset="0"/>
-              <a:buChar char="•"/>
-            </a:pPr>
-            <a:r>
-              <a:rPr lang="en-US" dirty="0" smtClean="0"/>
-              <a:t>Predators invest much less frequently than prey</a:t>
-            </a:r>
-            <a:endParaRPr lang="en-US" dirty="0"/>
-          </a:p>
-          <a:p>
-            <a:r>
-              <a:rPr lang="en-US" dirty="0" smtClean="0"/>
-              <a:t>In hormone dataset (maybe in both)</a:t>
-            </a:r>
-          </a:p>
-          <a:p>
-            <a:pPr marL="285750" indent="-285750">
-              <a:buFont typeface="Arial" charset="0"/>
-              <a:buChar char="•"/>
-            </a:pPr>
-            <a:r>
-              <a:rPr lang="en-US" dirty="0" smtClean="0"/>
-              <a:t>Previous reward impacts current trial, and this is more pronounced in prey than in predators</a:t>
-            </a:r>
-            <a:endParaRPr lang="en-US" dirty="0"/>
-          </a:p>
-        </p:txBody>
-      </p:sp>
-    </p:spTree>
-    <p:extLst>
-      <p:ext uri="{BB962C8B-B14F-4D97-AF65-F5344CB8AC3E}">
-        <p14:creationId xmlns:p14="http://schemas.microsoft.com/office/powerpoint/2010/main" val="228006838"/>
       </p:ext>
     </p:extLst>
   </p:cSld>

</xml_diff>

<commit_message>
fits to hor dataset
</commit_message>
<xml_diff>
--- a/PPG/reports/PPG progress report 2017_11_06.pptx
+++ b/PPG/reports/PPG progress report 2017_11_06.pptx
@@ -236,7 +236,7 @@
           <a:p>
             <a:fld id="{93497C26-5219-954A-A522-4F368E7A7ADA}" type="datetimeFigureOut">
               <a:rPr lang="en-US" smtClean="0"/>
-              <a:t>10/31/17</a:t>
+              <a:t>11/9/17</a:t>
             </a:fld>
             <a:endParaRPr lang="en-US"/>
           </a:p>
@@ -821,7 +821,7 @@
           <a:p>
             <a:fld id="{A2BA52DA-B0BC-A24E-B717-007855D4CE0B}" type="slidenum">
               <a:rPr lang="en-US" smtClean="0"/>
-              <a:t>31</a:t>
+              <a:t>21</a:t>
             </a:fld>
             <a:endParaRPr lang="en-US"/>
           </a:p>
@@ -830,7 +830,7 @@
     </p:spTree>
     <p:extLst>
       <p:ext uri="{BB962C8B-B14F-4D97-AF65-F5344CB8AC3E}">
-        <p14:creationId xmlns:p14="http://schemas.microsoft.com/office/powerpoint/2010/main" val="1668090357"/>
+        <p14:creationId xmlns:p14="http://schemas.microsoft.com/office/powerpoint/2010/main" val="385470816"/>
       </p:ext>
     </p:extLst>
   </p:cSld>
@@ -905,7 +905,7 @@
           <a:p>
             <a:fld id="{A2BA52DA-B0BC-A24E-B717-007855D4CE0B}" type="slidenum">
               <a:rPr lang="en-US" smtClean="0"/>
-              <a:t>32</a:t>
+              <a:t>31</a:t>
             </a:fld>
             <a:endParaRPr lang="en-US"/>
           </a:p>
@@ -914,7 +914,7 @@
     </p:spTree>
     <p:extLst>
       <p:ext uri="{BB962C8B-B14F-4D97-AF65-F5344CB8AC3E}">
-        <p14:creationId xmlns:p14="http://schemas.microsoft.com/office/powerpoint/2010/main" val="766678154"/>
+        <p14:creationId xmlns:p14="http://schemas.microsoft.com/office/powerpoint/2010/main" val="1668090357"/>
       </p:ext>
     </p:extLst>
   </p:cSld>
@@ -989,7 +989,7 @@
           <a:p>
             <a:fld id="{A2BA52DA-B0BC-A24E-B717-007855D4CE0B}" type="slidenum">
               <a:rPr lang="en-US" smtClean="0"/>
-              <a:t>38</a:t>
+              <a:t>32</a:t>
             </a:fld>
             <a:endParaRPr lang="en-US"/>
           </a:p>
@@ -998,7 +998,7 @@
     </p:spTree>
     <p:extLst>
       <p:ext uri="{BB962C8B-B14F-4D97-AF65-F5344CB8AC3E}">
-        <p14:creationId xmlns:p14="http://schemas.microsoft.com/office/powerpoint/2010/main" val="485749737"/>
+        <p14:creationId xmlns:p14="http://schemas.microsoft.com/office/powerpoint/2010/main" val="766678154"/>
       </p:ext>
     </p:extLst>
   </p:cSld>
@@ -1073,6 +1073,90 @@
           <a:p>
             <a:fld id="{A2BA52DA-B0BC-A24E-B717-007855D4CE0B}" type="slidenum">
               <a:rPr lang="en-US" smtClean="0"/>
+              <a:t>38</a:t>
+            </a:fld>
+            <a:endParaRPr lang="en-US"/>
+          </a:p>
+        </p:txBody>
+      </p:sp>
+    </p:spTree>
+    <p:extLst>
+      <p:ext uri="{BB962C8B-B14F-4D97-AF65-F5344CB8AC3E}">
+        <p14:creationId xmlns:p14="http://schemas.microsoft.com/office/powerpoint/2010/main" val="485749737"/>
+      </p:ext>
+    </p:extLst>
+  </p:cSld>
+  <p:clrMapOvr>
+    <a:masterClrMapping/>
+  </p:clrMapOvr>
+</p:notes>
+</file>
+
+<file path=ppt/notesSlides/notesSlide8.xml><?xml version="1.0" encoding="utf-8"?>
+<p:notes xmlns:a="http://schemas.openxmlformats.org/drawingml/2006/main" xmlns:r="http://schemas.openxmlformats.org/officeDocument/2006/relationships" xmlns:p="http://schemas.openxmlformats.org/presentationml/2006/main">
+  <p:cSld>
+    <p:spTree>
+      <p:nvGrpSpPr>
+        <p:cNvPr id="1" name=""/>
+        <p:cNvGrpSpPr/>
+        <p:nvPr/>
+      </p:nvGrpSpPr>
+      <p:grpSpPr>
+        <a:xfrm>
+          <a:off x="0" y="0"/>
+          <a:ext cx="0" cy="0"/>
+          <a:chOff x="0" y="0"/>
+          <a:chExt cx="0" cy="0"/>
+        </a:xfrm>
+      </p:grpSpPr>
+      <p:sp>
+        <p:nvSpPr>
+          <p:cNvPr id="2" name="Slide Image Placeholder 1"/>
+          <p:cNvSpPr>
+            <a:spLocks noGrp="1" noRot="1" noChangeAspect="1"/>
+          </p:cNvSpPr>
+          <p:nvPr>
+            <p:ph type="sldImg"/>
+          </p:nvPr>
+        </p:nvSpPr>
+        <p:spPr/>
+      </p:sp>
+      <p:sp>
+        <p:nvSpPr>
+          <p:cNvPr id="3" name="Notes Placeholder 2"/>
+          <p:cNvSpPr>
+            <a:spLocks noGrp="1"/>
+          </p:cNvSpPr>
+          <p:nvPr>
+            <p:ph type="body" idx="1"/>
+          </p:nvPr>
+        </p:nvSpPr>
+        <p:spPr/>
+        <p:txBody>
+          <a:bodyPr/>
+          <a:lstStyle/>
+          <a:p>
+            <a:endParaRPr lang="en-US" dirty="0"/>
+          </a:p>
+        </p:txBody>
+      </p:sp>
+      <p:sp>
+        <p:nvSpPr>
+          <p:cNvPr id="4" name="Slide Number Placeholder 3"/>
+          <p:cNvSpPr>
+            <a:spLocks noGrp="1"/>
+          </p:cNvSpPr>
+          <p:nvPr>
+            <p:ph type="sldNum" sz="quarter" idx="10"/>
+          </p:nvPr>
+        </p:nvSpPr>
+        <p:spPr/>
+        <p:txBody>
+          <a:bodyPr/>
+          <a:lstStyle/>
+          <a:p>
+            <a:fld id="{A2BA52DA-B0BC-A24E-B717-007855D4CE0B}" type="slidenum">
+              <a:rPr lang="en-US" smtClean="0"/>
               <a:t>39</a:t>
             </a:fld>
             <a:endParaRPr lang="en-US"/>
@@ -1092,7 +1176,7 @@
 </p:notes>
 </file>
 
-<file path=ppt/notesSlides/notesSlide8.xml><?xml version="1.0" encoding="utf-8"?>
+<file path=ppt/notesSlides/notesSlide9.xml><?xml version="1.0" encoding="utf-8"?>
 <p:notes xmlns:a="http://schemas.openxmlformats.org/drawingml/2006/main" xmlns:r="http://schemas.openxmlformats.org/officeDocument/2006/relationships" xmlns:p="http://schemas.openxmlformats.org/presentationml/2006/main">
   <p:cSld>
     <p:spTree>
@@ -1307,7 +1391,7 @@
           <a:p>
             <a:fld id="{AB24BD30-CF79-6742-90BF-1953A7F126BB}" type="datetimeFigureOut">
               <a:rPr lang="en-US" smtClean="0"/>
-              <a:t>10/31/17</a:t>
+              <a:t>11/9/17</a:t>
             </a:fld>
             <a:endParaRPr lang="en-US"/>
           </a:p>
@@ -1477,7 +1561,7 @@
           <a:p>
             <a:fld id="{AB24BD30-CF79-6742-90BF-1953A7F126BB}" type="datetimeFigureOut">
               <a:rPr lang="en-US" smtClean="0"/>
-              <a:t>10/31/17</a:t>
+              <a:t>11/9/17</a:t>
             </a:fld>
             <a:endParaRPr lang="en-US"/>
           </a:p>
@@ -1657,7 +1741,7 @@
           <a:p>
             <a:fld id="{AB24BD30-CF79-6742-90BF-1953A7F126BB}" type="datetimeFigureOut">
               <a:rPr lang="en-US" smtClean="0"/>
-              <a:t>10/31/17</a:t>
+              <a:t>11/9/17</a:t>
             </a:fld>
             <a:endParaRPr lang="en-US"/>
           </a:p>
@@ -1827,7 +1911,7 @@
           <a:p>
             <a:fld id="{AB24BD30-CF79-6742-90BF-1953A7F126BB}" type="datetimeFigureOut">
               <a:rPr lang="en-US" smtClean="0"/>
-              <a:t>10/31/17</a:t>
+              <a:t>11/9/17</a:t>
             </a:fld>
             <a:endParaRPr lang="en-US"/>
           </a:p>
@@ -2073,7 +2157,7 @@
           <a:p>
             <a:fld id="{AB24BD30-CF79-6742-90BF-1953A7F126BB}" type="datetimeFigureOut">
               <a:rPr lang="en-US" smtClean="0"/>
-              <a:t>10/31/17</a:t>
+              <a:t>11/9/17</a:t>
             </a:fld>
             <a:endParaRPr lang="en-US"/>
           </a:p>
@@ -2305,7 +2389,7 @@
           <a:p>
             <a:fld id="{AB24BD30-CF79-6742-90BF-1953A7F126BB}" type="datetimeFigureOut">
               <a:rPr lang="en-US" smtClean="0"/>
-              <a:t>10/31/17</a:t>
+              <a:t>11/9/17</a:t>
             </a:fld>
             <a:endParaRPr lang="en-US"/>
           </a:p>
@@ -2672,7 +2756,7 @@
           <a:p>
             <a:fld id="{AB24BD30-CF79-6742-90BF-1953A7F126BB}" type="datetimeFigureOut">
               <a:rPr lang="en-US" smtClean="0"/>
-              <a:t>10/31/17</a:t>
+              <a:t>11/9/17</a:t>
             </a:fld>
             <a:endParaRPr lang="en-US"/>
           </a:p>
@@ -2790,7 +2874,7 @@
           <a:p>
             <a:fld id="{AB24BD30-CF79-6742-90BF-1953A7F126BB}" type="datetimeFigureOut">
               <a:rPr lang="en-US" smtClean="0"/>
-              <a:t>10/31/17</a:t>
+              <a:t>11/9/17</a:t>
             </a:fld>
             <a:endParaRPr lang="en-US"/>
           </a:p>
@@ -2885,7 +2969,7 @@
           <a:p>
             <a:fld id="{AB24BD30-CF79-6742-90BF-1953A7F126BB}" type="datetimeFigureOut">
               <a:rPr lang="en-US" smtClean="0"/>
-              <a:t>10/31/17</a:t>
+              <a:t>11/9/17</a:t>
             </a:fld>
             <a:endParaRPr lang="en-US"/>
           </a:p>
@@ -3162,7 +3246,7 @@
           <a:p>
             <a:fld id="{AB24BD30-CF79-6742-90BF-1953A7F126BB}" type="datetimeFigureOut">
               <a:rPr lang="en-US" smtClean="0"/>
-              <a:t>10/31/17</a:t>
+              <a:t>11/9/17</a:t>
             </a:fld>
             <a:endParaRPr lang="en-US"/>
           </a:p>
@@ -3415,7 +3499,7 @@
           <a:p>
             <a:fld id="{AB24BD30-CF79-6742-90BF-1953A7F126BB}" type="datetimeFigureOut">
               <a:rPr lang="en-US" smtClean="0"/>
-              <a:t>10/31/17</a:t>
+              <a:t>11/9/17</a:t>
             </a:fld>
             <a:endParaRPr lang="en-US"/>
           </a:p>
@@ -3628,7 +3712,7 @@
           <a:p>
             <a:fld id="{AB24BD30-CF79-6742-90BF-1953A7F126BB}" type="datetimeFigureOut">
               <a:rPr lang="en-US" smtClean="0"/>
-              <a:t>10/31/17</a:t>
+              <a:t>11/9/17</a:t>
             </a:fld>
             <a:endParaRPr lang="en-US"/>
           </a:p>
@@ -5508,11 +5592,7 @@
             </a:r>
             <a:r>
               <a:rPr lang="en-US" sz="1600" dirty="0" smtClean="0"/>
-              <a:t> i.e. mimicking fMRI dataset). Simulations were all playing against acceptance function estimated from actual distribution against which real subjects were playing. </a:t>
-            </a:r>
-            <a:r>
-              <a:rPr lang="en-US" sz="1600" dirty="0" smtClean="0"/>
-              <a:t>For each simulation, model parameters were randomly selected. Models were then fit to data generated from those simulations. These plots show correlations between the parameters recovered from the fitting process and the true parameters used to generate the data</a:t>
+              <a:t> i.e. mimicking fMRI dataset). Simulations were all playing against acceptance function estimated from actual distribution against which real subjects were playing. For each simulation, model parameters were randomly selected. Models were then fit to data generated from those simulations. These plots show correlations between the parameters recovered from the fitting process and the true parameters used to generate the data</a:t>
             </a:r>
           </a:p>
           <a:p>
@@ -5574,11 +5654,7 @@
           <a:p>
             <a:r>
               <a:rPr lang="en-US" sz="1200" dirty="0" smtClean="0"/>
-              <a:t>from </a:t>
-            </a:r>
-            <a:r>
-              <a:rPr lang="en-US" sz="1200" dirty="0" smtClean="0"/>
-              <a:t>PPG/</a:t>
+              <a:t>from PPG/</a:t>
             </a:r>
             <a:r>
               <a:rPr lang="en-US" sz="1200" dirty="0" err="1" smtClean="0"/>
@@ -5735,11 +5811,7 @@
             </a:r>
             <a:r>
               <a:rPr lang="en-US" sz="1600" dirty="0"/>
-              <a:t> i.e. mimicking fMRI dataset). </a:t>
-            </a:r>
-            <a:r>
-              <a:rPr lang="en-US" sz="1600" dirty="0"/>
-              <a:t>Models were then fit to data generated from those simulations. These plots show correlations between the parameters recovered from the fitting process and the true parameters used to generate the data</a:t>
+              <a:t> i.e. mimicking fMRI dataset). Models were then fit to data generated from those simulations. These plots show correlations between the parameters recovered from the fitting process and the true parameters used to generate the data</a:t>
             </a:r>
           </a:p>
           <a:p>
@@ -6131,11 +6203,7 @@
             </a:r>
             <a:r>
               <a:rPr lang="en-US" sz="1600" dirty="0"/>
-              <a:t> i.e. mimicking fMRI dataset). </a:t>
-            </a:r>
-            <a:r>
-              <a:rPr lang="en-US" sz="1600" dirty="0"/>
-              <a:t>Models were then fit to data generated from those simulations. These plots show correlations between the parameters recovered from the fitting process and the true parameters used to generate the data</a:t>
+              <a:t> i.e. mimicking fMRI dataset). Models were then fit to data generated from those simulations. These plots show correlations between the parameters recovered from the fitting process and the true parameters used to generate the data</a:t>
             </a:r>
           </a:p>
           <a:p>
@@ -6358,11 +6426,7 @@
           <a:p>
             <a:r>
               <a:rPr lang="en-US" sz="1600" dirty="0" smtClean="0"/>
-              <a:t>Confusion matrices. Each row represents the model that was used to simulate the data (cases 1-4), and each column represents the model that was used to fit the data</a:t>
-            </a:r>
-            <a:r>
-              <a:rPr lang="en-US" sz="1600" dirty="0" smtClean="0"/>
-              <a:t>. Darkness of cell indicates evidence in favor of model, gleaned from </a:t>
+              <a:t>Confusion matrices. Each row represents the model that was used to simulate the data (cases 1-4), and each column represents the model that was used to fit the data. Darkness of cell indicates evidence in favor of model, gleaned from </a:t>
             </a:r>
             <a:r>
               <a:rPr lang="en-US" sz="1600" dirty="0" err="1"/>
@@ -6382,11 +6446,7 @@
             </a:r>
             <a:r>
               <a:rPr lang="en-US" sz="1600" dirty="0" smtClean="0"/>
-              <a:t>ayesian A</a:t>
-            </a:r>
-            <a:r>
-              <a:rPr lang="en-US" sz="1600" dirty="0" smtClean="0"/>
-              <a:t>nalysis implemented in the VBA toolbox for MATLAB (</a:t>
+              <a:t>ayesian Analysis implemented in the VBA toolbox for MATLAB (</a:t>
             </a:r>
             <a:r>
               <a:rPr lang="en-US" sz="1600" dirty="0" err="1" smtClean="0"/>
@@ -6396,7 +6456,6 @@
               <a:rPr lang="en-US" sz="1600" dirty="0" smtClean="0"/>
               <a:t> et al., 2014). The black diagonal and white off-diagonal indicate that models are sufficiently identifiable with respect to one-another</a:t>
             </a:r>
-            <a:endParaRPr lang="en-US" sz="1600" dirty="0" smtClean="0"/>
           </a:p>
         </p:txBody>
       </p:sp>
@@ -8234,18 +8293,10 @@
                 <a:ea typeface="Arial" charset="0"/>
                 <a:cs typeface="Arial" charset="0"/>
               </a:rPr>
-              <a:t>	Whole brain (positive): lots </a:t>
-            </a:r>
-            <a:r>
-              <a:rPr lang="en-US" sz="1600" smtClean="0">
-                <a:latin typeface="Arial" charset="0"/>
-                <a:ea typeface="Arial" charset="0"/>
-                <a:cs typeface="Arial" charset="0"/>
-              </a:rPr>
-              <a:t>of places, </a:t>
-            </a:r>
-            <a:r>
-              <a:rPr lang="en-US" sz="1600" i="1" smtClean="0">
+              <a:t>	Whole brain (positive): lots of places, </a:t>
+            </a:r>
+            <a:r>
+              <a:rPr lang="en-US" sz="1600" i="1" dirty="0" smtClean="0">
                 <a:latin typeface="Arial" charset="0"/>
                 <a:ea typeface="Arial" charset="0"/>
                 <a:cs typeface="Arial" charset="0"/>
@@ -8253,28 +8304,28 @@
               <a:t>p</a:t>
             </a:r>
             <a:r>
-              <a:rPr lang="en-US" sz="1600" smtClean="0">
-                <a:latin typeface="Arial" charset="0"/>
-                <a:ea typeface="Arial" charset="0"/>
-                <a:cs typeface="Arial" charset="0"/>
-              </a:rPr>
-              <a:t>,0.025: </a:t>
-            </a:r>
-            <a:r>
-              <a:rPr lang="en-US" sz="1600" dirty="0" smtClean="0">
-                <a:latin typeface="Arial" charset="0"/>
-                <a:ea typeface="Arial" charset="0"/>
-                <a:cs typeface="Arial" charset="0"/>
-              </a:rPr>
-              <a:t>IFG</a:t>
-            </a:r>
-            <a:r>
-              <a:rPr lang="en-US" sz="1600" smtClean="0">
-                <a:latin typeface="Arial" charset="0"/>
-                <a:ea typeface="Arial" charset="0"/>
-                <a:cs typeface="Arial" charset="0"/>
-              </a:rPr>
-              <a:t>, thalamus, TPJ, </a:t>
+              <a:rPr lang="en-US" sz="1600" dirty="0" smtClean="0">
+                <a:latin typeface="Arial" charset="0"/>
+                <a:ea typeface="Arial" charset="0"/>
+                <a:cs typeface="Arial" charset="0"/>
+              </a:rPr>
+              <a:t>&gt;</a:t>
+            </a:r>
+            <a:r>
+              <a:rPr lang="en-US" sz="1600" dirty="0" smtClean="0">
+                <a:latin typeface="Arial" charset="0"/>
+                <a:ea typeface="Arial" charset="0"/>
+                <a:cs typeface="Arial" charset="0"/>
+              </a:rPr>
+              <a:t>0.025</a:t>
+            </a:r>
+            <a:r>
+              <a:rPr lang="en-US" sz="1600" dirty="0" smtClean="0">
+                <a:latin typeface="Arial" charset="0"/>
+                <a:ea typeface="Arial" charset="0"/>
+                <a:cs typeface="Arial" charset="0"/>
+              </a:rPr>
+              <a:t>: IFG, thalamus, TPJ, </a:t>
             </a:r>
             <a:endParaRPr lang="en-US" sz="1600" dirty="0">
               <a:latin typeface="Arial" charset="0"/>
@@ -8417,11 +8468,6 @@
               </a:rPr>
               <a:t>	</a:t>
             </a:r>
-            <a:endParaRPr lang="en-US" sz="1600" dirty="0">
-              <a:latin typeface="Arial" charset="0"/>
-              <a:ea typeface="Arial" charset="0"/>
-              <a:cs typeface="Arial" charset="0"/>
-            </a:endParaRPr>
           </a:p>
           <a:p>
             <a:pPr>
@@ -19778,8 +19824,8 @@
           <a:chExt cx="0" cy="0"/>
         </a:xfrm>
       </p:grpSpPr>
-      <mc:AlternateContent xmlns:mc="http://schemas.openxmlformats.org/markup-compatibility/2006">
-        <mc:Choice xmlns:a14="http://schemas.microsoft.com/office/drawing/2010/main" Requires="a14">
+      <mc:AlternateContent xmlns:mc="http://schemas.openxmlformats.org/markup-compatibility/2006" xmlns:a14="http://schemas.microsoft.com/office/drawing/2010/main">
+        <mc:Choice Requires="a14">
           <p:sp>
             <p:nvSpPr>
               <p:cNvPr id="4" name="Rectangle 3"/>
@@ -20440,7 +20486,7 @@
             </p:txBody>
           </p:sp>
         </mc:Choice>
-        <mc:Fallback>
+        <mc:Fallback xmlns="">
           <p:sp>
             <p:nvSpPr>
               <p:cNvPr id="4" name="Rectangle 3"/>

</xml_diff>